<commit_message>
0->1 and intent, location, details
</commit_message>
<xml_diff>
--- a/Printouts.pptx
+++ b/Printouts.pptx
@@ -5,31 +5,33 @@
     <p:sldMasterId id="2147483658" r:id="rId1"/>
   </p:sldMasterIdLst>
   <p:notesMasterIdLst>
-    <p:notesMasterId r:id="rId24"/>
+    <p:notesMasterId r:id="rId26"/>
   </p:notesMasterIdLst>
   <p:sldIdLst>
     <p:sldId id="285" r:id="rId2"/>
     <p:sldId id="261" r:id="rId3"/>
-    <p:sldId id="928" r:id="rId4"/>
-    <p:sldId id="927" r:id="rId5"/>
-    <p:sldId id="273" r:id="rId6"/>
-    <p:sldId id="929" r:id="rId7"/>
-    <p:sldId id="930" r:id="rId8"/>
-    <p:sldId id="931" r:id="rId9"/>
-    <p:sldId id="924" r:id="rId10"/>
-    <p:sldId id="290" r:id="rId11"/>
-    <p:sldId id="934" r:id="rId12"/>
-    <p:sldId id="926" r:id="rId13"/>
-    <p:sldId id="935" r:id="rId14"/>
-    <p:sldId id="932" r:id="rId15"/>
-    <p:sldId id="937" r:id="rId16"/>
-    <p:sldId id="938" r:id="rId17"/>
-    <p:sldId id="939" r:id="rId18"/>
-    <p:sldId id="940" r:id="rId19"/>
-    <p:sldId id="291" r:id="rId20"/>
-    <p:sldId id="941" r:id="rId21"/>
-    <p:sldId id="942" r:id="rId22"/>
-    <p:sldId id="943" r:id="rId23"/>
+    <p:sldId id="944" r:id="rId4"/>
+    <p:sldId id="945" r:id="rId5"/>
+    <p:sldId id="928" r:id="rId6"/>
+    <p:sldId id="927" r:id="rId7"/>
+    <p:sldId id="273" r:id="rId8"/>
+    <p:sldId id="929" r:id="rId9"/>
+    <p:sldId id="930" r:id="rId10"/>
+    <p:sldId id="931" r:id="rId11"/>
+    <p:sldId id="924" r:id="rId12"/>
+    <p:sldId id="290" r:id="rId13"/>
+    <p:sldId id="934" r:id="rId14"/>
+    <p:sldId id="926" r:id="rId15"/>
+    <p:sldId id="935" r:id="rId16"/>
+    <p:sldId id="932" r:id="rId17"/>
+    <p:sldId id="937" r:id="rId18"/>
+    <p:sldId id="938" r:id="rId19"/>
+    <p:sldId id="939" r:id="rId20"/>
+    <p:sldId id="940" r:id="rId21"/>
+    <p:sldId id="291" r:id="rId22"/>
+    <p:sldId id="941" r:id="rId23"/>
+    <p:sldId id="942" r:id="rId24"/>
+    <p:sldId id="943" r:id="rId25"/>
   </p:sldIdLst>
   <p:sldSz cx="9144000" cy="6858000" type="letter"/>
   <p:notesSz cx="6858000" cy="9144000"/>
@@ -825,7 +827,7 @@
   <p:cSld>
     <p:spTree>
       <p:nvGrpSpPr>
-        <p:cNvPr id="1" name="Shape 70"/>
+        <p:cNvPr id="1" name="Shape 193"/>
         <p:cNvGrpSpPr/>
         <p:nvPr/>
       </p:nvGrpSpPr>
@@ -839,7 +841,7 @@
       </p:grpSpPr>
       <p:sp>
         <p:nvSpPr>
-          <p:cNvPr id="71" name="Google Shape;71;g35f391192_029:notes"/>
+          <p:cNvPr id="194" name="Google Shape;194;g35ed75ccf_057:notes"/>
           <p:cNvSpPr>
             <a:spLocks noGrp="1" noRot="1" noChangeAspect="1"/>
           </p:cNvSpPr>
@@ -880,7 +882,7 @@
       </p:sp>
       <p:sp>
         <p:nvSpPr>
-          <p:cNvPr id="72" name="Google Shape;72;g35f391192_029:notes"/>
+          <p:cNvPr id="195" name="Google Shape;195;g35ed75ccf_057:notes"/>
           <p:cNvSpPr txBox="1">
             <a:spLocks noGrp="1"/>
           </p:cNvSpPr>
@@ -912,14 +914,14 @@
               </a:spcAft>
               <a:buNone/>
             </a:pPr>
-            <a:endParaRPr dirty="0"/>
+            <a:endParaRPr/>
           </a:p>
         </p:txBody>
       </p:sp>
     </p:spTree>
     <p:extLst>
       <p:ext uri="{BB962C8B-B14F-4D97-AF65-F5344CB8AC3E}">
-        <p14:creationId xmlns:p14="http://schemas.microsoft.com/office/powerpoint/2010/main" val="2996030857"/>
+        <p14:creationId xmlns:p14="http://schemas.microsoft.com/office/powerpoint/2010/main" val="685667647"/>
       </p:ext>
     </p:extLst>
   </p:cSld>
@@ -930,6 +932,75 @@
 </file>
 
 <file path=ppt/notesSlides/notesSlide11.xml><?xml version="1.0" encoding="utf-8"?>
+<p:notes xmlns:a="http://schemas.openxmlformats.org/drawingml/2006/main" xmlns:r="http://schemas.openxmlformats.org/officeDocument/2006/relationships" xmlns:p="http://schemas.openxmlformats.org/presentationml/2006/main">
+  <p:cSld>
+    <p:spTree>
+      <p:nvGrpSpPr>
+        <p:cNvPr id="1" name=""/>
+        <p:cNvGrpSpPr/>
+        <p:nvPr/>
+      </p:nvGrpSpPr>
+      <p:grpSpPr>
+        <a:xfrm>
+          <a:off x="0" y="0"/>
+          <a:ext cx="0" cy="0"/>
+          <a:chOff x="0" y="0"/>
+          <a:chExt cx="0" cy="0"/>
+        </a:xfrm>
+      </p:grpSpPr>
+      <p:sp>
+        <p:nvSpPr>
+          <p:cNvPr id="2" name="Slide Image Placeholder 1"/>
+          <p:cNvSpPr>
+            <a:spLocks noGrp="1" noRot="1" noChangeAspect="1"/>
+          </p:cNvSpPr>
+          <p:nvPr>
+            <p:ph type="sldImg"/>
+          </p:nvPr>
+        </p:nvSpPr>
+        <p:spPr>
+          <a:xfrm>
+            <a:off x="1143000" y="685800"/>
+            <a:ext cx="4572000" cy="3429000"/>
+          </a:xfrm>
+        </p:spPr>
+      </p:sp>
+      <p:sp>
+        <p:nvSpPr>
+          <p:cNvPr id="3" name="Notes Placeholder 2"/>
+          <p:cNvSpPr>
+            <a:spLocks noGrp="1"/>
+          </p:cNvSpPr>
+          <p:nvPr>
+            <p:ph type="body" idx="1"/>
+          </p:nvPr>
+        </p:nvSpPr>
+        <p:spPr/>
+        <p:txBody>
+          <a:bodyPr/>
+          <a:lstStyle/>
+          <a:p>
+            <a:r>
+              <a:rPr lang="en-GB" dirty="0"/>
+              <a:t>So we think of it as…</a:t>
+            </a:r>
+          </a:p>
+        </p:txBody>
+      </p:sp>
+    </p:spTree>
+    <p:extLst>
+      <p:ext uri="{BB962C8B-B14F-4D97-AF65-F5344CB8AC3E}">
+        <p14:creationId xmlns:p14="http://schemas.microsoft.com/office/powerpoint/2010/main" val="448274877"/>
+      </p:ext>
+    </p:extLst>
+  </p:cSld>
+  <p:clrMapOvr>
+    <a:masterClrMapping/>
+  </p:clrMapOvr>
+</p:notes>
+</file>
+
+<file path=ppt/notesSlides/notesSlide12.xml><?xml version="1.0" encoding="utf-8"?>
 <p:notes xmlns:a="http://schemas.openxmlformats.org/drawingml/2006/main" xmlns:r="http://schemas.openxmlformats.org/officeDocument/2006/relationships" xmlns:p="http://schemas.openxmlformats.org/presentationml/2006/main" showMasterSp="0" showMasterPhAnim="0">
   <p:cSld>
     <p:spTree>
@@ -1028,7 +1099,7 @@
     </p:spTree>
     <p:extLst>
       <p:ext uri="{BB962C8B-B14F-4D97-AF65-F5344CB8AC3E}">
-        <p14:creationId xmlns:p14="http://schemas.microsoft.com/office/powerpoint/2010/main" val="2161047769"/>
+        <p14:creationId xmlns:p14="http://schemas.microsoft.com/office/powerpoint/2010/main" val="2996030857"/>
       </p:ext>
     </p:extLst>
   </p:cSld>
@@ -1038,12 +1109,12 @@
 </p:notes>
 </file>
 
-<file path=ppt/notesSlides/notesSlide12.xml><?xml version="1.0" encoding="utf-8"?>
+<file path=ppt/notesSlides/notesSlide13.xml><?xml version="1.0" encoding="utf-8"?>
 <p:notes xmlns:a="http://schemas.openxmlformats.org/drawingml/2006/main" xmlns:r="http://schemas.openxmlformats.org/officeDocument/2006/relationships" xmlns:p="http://schemas.openxmlformats.org/presentationml/2006/main" showMasterSp="0" showMasterPhAnim="0">
   <p:cSld>
     <p:spTree>
       <p:nvGrpSpPr>
-        <p:cNvPr id="1" name="Shape 193"/>
+        <p:cNvPr id="1" name="Shape 70"/>
         <p:cNvGrpSpPr/>
         <p:nvPr/>
       </p:nvGrpSpPr>
@@ -1057,7 +1128,7 @@
       </p:grpSpPr>
       <p:sp>
         <p:nvSpPr>
-          <p:cNvPr id="194" name="Google Shape;194;g35ed75ccf_057:notes"/>
+          <p:cNvPr id="71" name="Google Shape;71;g35f391192_029:notes"/>
           <p:cNvSpPr>
             <a:spLocks noGrp="1" noRot="1" noChangeAspect="1"/>
           </p:cNvSpPr>
@@ -1098,7 +1169,7 @@
       </p:sp>
       <p:sp>
         <p:nvSpPr>
-          <p:cNvPr id="195" name="Google Shape;195;g35ed75ccf_057:notes"/>
+          <p:cNvPr id="72" name="Google Shape;72;g35f391192_029:notes"/>
           <p:cNvSpPr txBox="1">
             <a:spLocks noGrp="1"/>
           </p:cNvSpPr>
@@ -1130,123 +1201,14 @@
               </a:spcAft>
               <a:buNone/>
             </a:pPr>
-            <a:endParaRPr/>
+            <a:endParaRPr dirty="0"/>
           </a:p>
         </p:txBody>
       </p:sp>
     </p:spTree>
     <p:extLst>
       <p:ext uri="{BB962C8B-B14F-4D97-AF65-F5344CB8AC3E}">
-        <p14:creationId xmlns:p14="http://schemas.microsoft.com/office/powerpoint/2010/main" val="1086131925"/>
-      </p:ext>
-    </p:extLst>
-  </p:cSld>
-  <p:clrMapOvr>
-    <a:masterClrMapping/>
-  </p:clrMapOvr>
-</p:notes>
-</file>
-
-<file path=ppt/notesSlides/notesSlide13.xml><?xml version="1.0" encoding="utf-8"?>
-<p:notes xmlns:a="http://schemas.openxmlformats.org/drawingml/2006/main" xmlns:r="http://schemas.openxmlformats.org/officeDocument/2006/relationships" xmlns:p="http://schemas.openxmlformats.org/presentationml/2006/main" showMasterSp="0" showMasterPhAnim="0">
-  <p:cSld>
-    <p:spTree>
-      <p:nvGrpSpPr>
-        <p:cNvPr id="1" name="Shape 193"/>
-        <p:cNvGrpSpPr/>
-        <p:nvPr/>
-      </p:nvGrpSpPr>
-      <p:grpSpPr>
-        <a:xfrm>
-          <a:off x="0" y="0"/>
-          <a:ext cx="0" cy="0"/>
-          <a:chOff x="0" y="0"/>
-          <a:chExt cx="0" cy="0"/>
-        </a:xfrm>
-      </p:grpSpPr>
-      <p:sp>
-        <p:nvSpPr>
-          <p:cNvPr id="194" name="Google Shape;194;g35ed75ccf_057:notes"/>
-          <p:cNvSpPr>
-            <a:spLocks noGrp="1" noRot="1" noChangeAspect="1"/>
-          </p:cNvSpPr>
-          <p:nvPr>
-            <p:ph type="sldImg" idx="2"/>
-          </p:nvPr>
-        </p:nvSpPr>
-        <p:spPr>
-          <a:xfrm>
-            <a:off x="1143000" y="685800"/>
-            <a:ext cx="4572000" cy="3429000"/>
-          </a:xfrm>
-          <a:custGeom>
-            <a:avLst/>
-            <a:gdLst/>
-            <a:ahLst/>
-            <a:cxnLst/>
-            <a:rect l="l" t="t" r="r" b="b"/>
-            <a:pathLst>
-              <a:path w="120000" h="120000" extrusionOk="0">
-                <a:moveTo>
-                  <a:pt x="0" y="0"/>
-                </a:moveTo>
-                <a:lnTo>
-                  <a:pt x="120000" y="0"/>
-                </a:lnTo>
-                <a:lnTo>
-                  <a:pt x="120000" y="120000"/>
-                </a:lnTo>
-                <a:lnTo>
-                  <a:pt x="0" y="120000"/>
-                </a:lnTo>
-                <a:close/>
-              </a:path>
-            </a:pathLst>
-          </a:custGeom>
-        </p:spPr>
-      </p:sp>
-      <p:sp>
-        <p:nvSpPr>
-          <p:cNvPr id="195" name="Google Shape;195;g35ed75ccf_057:notes"/>
-          <p:cNvSpPr txBox="1">
-            <a:spLocks noGrp="1"/>
-          </p:cNvSpPr>
-          <p:nvPr>
-            <p:ph type="body" idx="1"/>
-          </p:nvPr>
-        </p:nvSpPr>
-        <p:spPr>
-          <a:xfrm>
-            <a:off x="685800" y="4343400"/>
-            <a:ext cx="5486400" cy="4114800"/>
-          </a:xfrm>
-          <a:prstGeom prst="rect">
-            <a:avLst/>
-          </a:prstGeom>
-        </p:spPr>
-        <p:txBody>
-          <a:bodyPr spcFirstLastPara="1" wrap="square" lIns="91425" tIns="91425" rIns="91425" bIns="91425" anchor="t" anchorCtr="0">
-            <a:noAutofit/>
-          </a:bodyPr>
-          <a:lstStyle/>
-          <a:p>
-            <a:pPr marL="0" lvl="0" indent="0" algn="l" rtl="0">
-              <a:spcBef>
-                <a:spcPts val="0"/>
-              </a:spcBef>
-              <a:spcAft>
-                <a:spcPts val="0"/>
-              </a:spcAft>
-              <a:buNone/>
-            </a:pPr>
-            <a:endParaRPr/>
-          </a:p>
-        </p:txBody>
-      </p:sp>
-    </p:spTree>
-    <p:extLst>
-      <p:ext uri="{BB962C8B-B14F-4D97-AF65-F5344CB8AC3E}">
-        <p14:creationId xmlns:p14="http://schemas.microsoft.com/office/powerpoint/2010/main" val="2987302084"/>
+        <p14:creationId xmlns:p14="http://schemas.microsoft.com/office/powerpoint/2010/main" val="2161047769"/>
       </p:ext>
     </p:extLst>
   </p:cSld>
@@ -1355,7 +1317,7 @@
     </p:spTree>
     <p:extLst>
       <p:ext uri="{BB962C8B-B14F-4D97-AF65-F5344CB8AC3E}">
-        <p14:creationId xmlns:p14="http://schemas.microsoft.com/office/powerpoint/2010/main" val="3969945367"/>
+        <p14:creationId xmlns:p14="http://schemas.microsoft.com/office/powerpoint/2010/main" val="1086131925"/>
       </p:ext>
     </p:extLst>
   </p:cSld>
@@ -1457,14 +1419,14 @@
               </a:spcAft>
               <a:buNone/>
             </a:pPr>
-            <a:endParaRPr dirty="0"/>
+            <a:endParaRPr/>
           </a:p>
         </p:txBody>
       </p:sp>
     </p:spTree>
     <p:extLst>
       <p:ext uri="{BB962C8B-B14F-4D97-AF65-F5344CB8AC3E}">
-        <p14:creationId xmlns:p14="http://schemas.microsoft.com/office/powerpoint/2010/main" val="4056296617"/>
+        <p14:creationId xmlns:p14="http://schemas.microsoft.com/office/powerpoint/2010/main" val="2987302084"/>
       </p:ext>
     </p:extLst>
   </p:cSld>
@@ -1566,14 +1528,14 @@
               </a:spcAft>
               <a:buNone/>
             </a:pPr>
-            <a:endParaRPr dirty="0"/>
+            <a:endParaRPr/>
           </a:p>
         </p:txBody>
       </p:sp>
     </p:spTree>
     <p:extLst>
       <p:ext uri="{BB962C8B-B14F-4D97-AF65-F5344CB8AC3E}">
-        <p14:creationId xmlns:p14="http://schemas.microsoft.com/office/powerpoint/2010/main" val="538354528"/>
+        <p14:creationId xmlns:p14="http://schemas.microsoft.com/office/powerpoint/2010/main" val="3969945367"/>
       </p:ext>
     </p:extLst>
   </p:cSld>
@@ -1675,14 +1637,14 @@
               </a:spcAft>
               <a:buNone/>
             </a:pPr>
-            <a:endParaRPr/>
+            <a:endParaRPr dirty="0"/>
           </a:p>
         </p:txBody>
       </p:sp>
     </p:spTree>
     <p:extLst>
       <p:ext uri="{BB962C8B-B14F-4D97-AF65-F5344CB8AC3E}">
-        <p14:creationId xmlns:p14="http://schemas.microsoft.com/office/powerpoint/2010/main" val="3010734866"/>
+        <p14:creationId xmlns:p14="http://schemas.microsoft.com/office/powerpoint/2010/main" val="4056296617"/>
       </p:ext>
     </p:extLst>
   </p:cSld>
@@ -1791,7 +1753,7 @@
     </p:spTree>
     <p:extLst>
       <p:ext uri="{BB962C8B-B14F-4D97-AF65-F5344CB8AC3E}">
-        <p14:creationId xmlns:p14="http://schemas.microsoft.com/office/powerpoint/2010/main" val="2155186391"/>
+        <p14:creationId xmlns:p14="http://schemas.microsoft.com/office/powerpoint/2010/main" val="538354528"/>
       </p:ext>
     </p:extLst>
   </p:cSld>
@@ -1893,14 +1855,14 @@
               </a:spcAft>
               <a:buNone/>
             </a:pPr>
-            <a:endParaRPr dirty="0"/>
+            <a:endParaRPr/>
           </a:p>
         </p:txBody>
       </p:sp>
     </p:spTree>
     <p:extLst>
       <p:ext uri="{BB962C8B-B14F-4D97-AF65-F5344CB8AC3E}">
-        <p14:creationId xmlns:p14="http://schemas.microsoft.com/office/powerpoint/2010/main" val="1702971818"/>
+        <p14:creationId xmlns:p14="http://schemas.microsoft.com/office/powerpoint/2010/main" val="3010734866"/>
       </p:ext>
     </p:extLst>
   </p:cSld>
@@ -2118,7 +2080,7 @@
     </p:spTree>
     <p:extLst>
       <p:ext uri="{BB962C8B-B14F-4D97-AF65-F5344CB8AC3E}">
-        <p14:creationId xmlns:p14="http://schemas.microsoft.com/office/powerpoint/2010/main" val="2323891150"/>
+        <p14:creationId xmlns:p14="http://schemas.microsoft.com/office/powerpoint/2010/main" val="2155186391"/>
       </p:ext>
     </p:extLst>
   </p:cSld>
@@ -2227,7 +2189,7 @@
     </p:spTree>
     <p:extLst>
       <p:ext uri="{BB962C8B-B14F-4D97-AF65-F5344CB8AC3E}">
-        <p14:creationId xmlns:p14="http://schemas.microsoft.com/office/powerpoint/2010/main" val="4112692426"/>
+        <p14:creationId xmlns:p14="http://schemas.microsoft.com/office/powerpoint/2010/main" val="1702971818"/>
       </p:ext>
     </p:extLst>
   </p:cSld>
@@ -2336,7 +2298,7 @@
     </p:spTree>
     <p:extLst>
       <p:ext uri="{BB962C8B-B14F-4D97-AF65-F5344CB8AC3E}">
-        <p14:creationId xmlns:p14="http://schemas.microsoft.com/office/powerpoint/2010/main" val="2948674435"/>
+        <p14:creationId xmlns:p14="http://schemas.microsoft.com/office/powerpoint/2010/main" val="2323891150"/>
       </p:ext>
     </p:extLst>
   </p:cSld>
@@ -2346,7 +2308,7 @@
 </p:notes>
 </file>
 
-<file path=ppt/notesSlides/notesSlide3.xml><?xml version="1.0" encoding="utf-8"?>
+<file path=ppt/notesSlides/notesSlide23.xml><?xml version="1.0" encoding="utf-8"?>
 <p:notes xmlns:a="http://schemas.openxmlformats.org/drawingml/2006/main" xmlns:r="http://schemas.openxmlformats.org/officeDocument/2006/relationships" xmlns:p="http://schemas.openxmlformats.org/presentationml/2006/main" showMasterSp="0" showMasterPhAnim="0">
   <p:cSld>
     <p:spTree>
@@ -2445,7 +2407,7 @@
     </p:spTree>
     <p:extLst>
       <p:ext uri="{BB962C8B-B14F-4D97-AF65-F5344CB8AC3E}">
-        <p14:creationId xmlns:p14="http://schemas.microsoft.com/office/powerpoint/2010/main" val="2122700934"/>
+        <p14:creationId xmlns:p14="http://schemas.microsoft.com/office/powerpoint/2010/main" val="4112692426"/>
       </p:ext>
     </p:extLst>
   </p:cSld>
@@ -2455,7 +2417,7 @@
 </p:notes>
 </file>
 
-<file path=ppt/notesSlides/notesSlide4.xml><?xml version="1.0" encoding="utf-8"?>
+<file path=ppt/notesSlides/notesSlide24.xml><?xml version="1.0" encoding="utf-8"?>
 <p:notes xmlns:a="http://schemas.openxmlformats.org/drawingml/2006/main" xmlns:r="http://schemas.openxmlformats.org/officeDocument/2006/relationships" xmlns:p="http://schemas.openxmlformats.org/presentationml/2006/main" showMasterSp="0" showMasterPhAnim="0">
   <p:cSld>
     <p:spTree>
@@ -2554,7 +2516,225 @@
     </p:spTree>
     <p:extLst>
       <p:ext uri="{BB962C8B-B14F-4D97-AF65-F5344CB8AC3E}">
-        <p14:creationId xmlns:p14="http://schemas.microsoft.com/office/powerpoint/2010/main" val="1519517479"/>
+        <p14:creationId xmlns:p14="http://schemas.microsoft.com/office/powerpoint/2010/main" val="2948674435"/>
+      </p:ext>
+    </p:extLst>
+  </p:cSld>
+  <p:clrMapOvr>
+    <a:masterClrMapping/>
+  </p:clrMapOvr>
+</p:notes>
+</file>
+
+<file path=ppt/notesSlides/notesSlide3.xml><?xml version="1.0" encoding="utf-8"?>
+<p:notes xmlns:a="http://schemas.openxmlformats.org/drawingml/2006/main" xmlns:r="http://schemas.openxmlformats.org/officeDocument/2006/relationships" xmlns:p="http://schemas.openxmlformats.org/presentationml/2006/main" showMasterSp="0" showMasterPhAnim="0">
+  <p:cSld>
+    <p:spTree>
+      <p:nvGrpSpPr>
+        <p:cNvPr id="1" name="Shape 83"/>
+        <p:cNvGrpSpPr/>
+        <p:nvPr/>
+      </p:nvGrpSpPr>
+      <p:grpSpPr>
+        <a:xfrm>
+          <a:off x="0" y="0"/>
+          <a:ext cx="0" cy="0"/>
+          <a:chOff x="0" y="0"/>
+          <a:chExt cx="0" cy="0"/>
+        </a:xfrm>
+      </p:grpSpPr>
+      <p:sp>
+        <p:nvSpPr>
+          <p:cNvPr id="84" name="Google Shape;84;p:notes"/>
+          <p:cNvSpPr>
+            <a:spLocks noGrp="1" noRot="1" noChangeAspect="1"/>
+          </p:cNvSpPr>
+          <p:nvPr>
+            <p:ph type="sldImg" idx="2"/>
+          </p:nvPr>
+        </p:nvSpPr>
+        <p:spPr>
+          <a:xfrm>
+            <a:off x="1143000" y="685800"/>
+            <a:ext cx="4572000" cy="3429000"/>
+          </a:xfrm>
+          <a:custGeom>
+            <a:avLst/>
+            <a:gdLst/>
+            <a:ahLst/>
+            <a:cxnLst/>
+            <a:rect l="l" t="t" r="r" b="b"/>
+            <a:pathLst>
+              <a:path w="120000" h="120000" extrusionOk="0">
+                <a:moveTo>
+                  <a:pt x="0" y="0"/>
+                </a:moveTo>
+                <a:lnTo>
+                  <a:pt x="120000" y="0"/>
+                </a:lnTo>
+                <a:lnTo>
+                  <a:pt x="120000" y="120000"/>
+                </a:lnTo>
+                <a:lnTo>
+                  <a:pt x="0" y="120000"/>
+                </a:lnTo>
+                <a:close/>
+              </a:path>
+            </a:pathLst>
+          </a:custGeom>
+        </p:spPr>
+      </p:sp>
+      <p:sp>
+        <p:nvSpPr>
+          <p:cNvPr id="85" name="Google Shape;85;p:notes"/>
+          <p:cNvSpPr txBox="1">
+            <a:spLocks noGrp="1"/>
+          </p:cNvSpPr>
+          <p:nvPr>
+            <p:ph type="body" idx="1"/>
+          </p:nvPr>
+        </p:nvSpPr>
+        <p:spPr>
+          <a:xfrm>
+            <a:off x="685800" y="4343400"/>
+            <a:ext cx="5486400" cy="4114800"/>
+          </a:xfrm>
+          <a:prstGeom prst="rect">
+            <a:avLst/>
+          </a:prstGeom>
+        </p:spPr>
+        <p:txBody>
+          <a:bodyPr spcFirstLastPara="1" wrap="square" lIns="91425" tIns="91425" rIns="91425" bIns="91425" anchor="t" anchorCtr="0">
+            <a:noAutofit/>
+          </a:bodyPr>
+          <a:lstStyle/>
+          <a:p>
+            <a:pPr marL="0" lvl="0" indent="0" algn="l" rtl="0">
+              <a:spcBef>
+                <a:spcPts val="0"/>
+              </a:spcBef>
+              <a:spcAft>
+                <a:spcPts val="0"/>
+              </a:spcAft>
+              <a:buNone/>
+            </a:pPr>
+            <a:endParaRPr/>
+          </a:p>
+        </p:txBody>
+      </p:sp>
+    </p:spTree>
+    <p:extLst>
+      <p:ext uri="{BB962C8B-B14F-4D97-AF65-F5344CB8AC3E}">
+        <p14:creationId xmlns:p14="http://schemas.microsoft.com/office/powerpoint/2010/main" val="1501897284"/>
+      </p:ext>
+    </p:extLst>
+  </p:cSld>
+  <p:clrMapOvr>
+    <a:masterClrMapping/>
+  </p:clrMapOvr>
+</p:notes>
+</file>
+
+<file path=ppt/notesSlides/notesSlide4.xml><?xml version="1.0" encoding="utf-8"?>
+<p:notes xmlns:a="http://schemas.openxmlformats.org/drawingml/2006/main" xmlns:r="http://schemas.openxmlformats.org/officeDocument/2006/relationships" xmlns:p="http://schemas.openxmlformats.org/presentationml/2006/main" showMasterSp="0" showMasterPhAnim="0">
+  <p:cSld>
+    <p:spTree>
+      <p:nvGrpSpPr>
+        <p:cNvPr id="1" name="Shape 83"/>
+        <p:cNvGrpSpPr/>
+        <p:nvPr/>
+      </p:nvGrpSpPr>
+      <p:grpSpPr>
+        <a:xfrm>
+          <a:off x="0" y="0"/>
+          <a:ext cx="0" cy="0"/>
+          <a:chOff x="0" y="0"/>
+          <a:chExt cx="0" cy="0"/>
+        </a:xfrm>
+      </p:grpSpPr>
+      <p:sp>
+        <p:nvSpPr>
+          <p:cNvPr id="84" name="Google Shape;84;p:notes"/>
+          <p:cNvSpPr>
+            <a:spLocks noGrp="1" noRot="1" noChangeAspect="1"/>
+          </p:cNvSpPr>
+          <p:nvPr>
+            <p:ph type="sldImg" idx="2"/>
+          </p:nvPr>
+        </p:nvSpPr>
+        <p:spPr>
+          <a:xfrm>
+            <a:off x="1143000" y="685800"/>
+            <a:ext cx="4572000" cy="3429000"/>
+          </a:xfrm>
+          <a:custGeom>
+            <a:avLst/>
+            <a:gdLst/>
+            <a:ahLst/>
+            <a:cxnLst/>
+            <a:rect l="l" t="t" r="r" b="b"/>
+            <a:pathLst>
+              <a:path w="120000" h="120000" extrusionOk="0">
+                <a:moveTo>
+                  <a:pt x="0" y="0"/>
+                </a:moveTo>
+                <a:lnTo>
+                  <a:pt x="120000" y="0"/>
+                </a:lnTo>
+                <a:lnTo>
+                  <a:pt x="120000" y="120000"/>
+                </a:lnTo>
+                <a:lnTo>
+                  <a:pt x="0" y="120000"/>
+                </a:lnTo>
+                <a:close/>
+              </a:path>
+            </a:pathLst>
+          </a:custGeom>
+        </p:spPr>
+      </p:sp>
+      <p:sp>
+        <p:nvSpPr>
+          <p:cNvPr id="85" name="Google Shape;85;p:notes"/>
+          <p:cNvSpPr txBox="1">
+            <a:spLocks noGrp="1"/>
+          </p:cNvSpPr>
+          <p:nvPr>
+            <p:ph type="body" idx="1"/>
+          </p:nvPr>
+        </p:nvSpPr>
+        <p:spPr>
+          <a:xfrm>
+            <a:off x="685800" y="4343400"/>
+            <a:ext cx="5486400" cy="4114800"/>
+          </a:xfrm>
+          <a:prstGeom prst="rect">
+            <a:avLst/>
+          </a:prstGeom>
+        </p:spPr>
+        <p:txBody>
+          <a:bodyPr spcFirstLastPara="1" wrap="square" lIns="91425" tIns="91425" rIns="91425" bIns="91425" anchor="t" anchorCtr="0">
+            <a:noAutofit/>
+          </a:bodyPr>
+          <a:lstStyle/>
+          <a:p>
+            <a:pPr marL="0" lvl="0" indent="0" algn="l" rtl="0">
+              <a:spcBef>
+                <a:spcPts val="0"/>
+              </a:spcBef>
+              <a:spcAft>
+                <a:spcPts val="0"/>
+              </a:spcAft>
+              <a:buNone/>
+            </a:pPr>
+            <a:endParaRPr/>
+          </a:p>
+        </p:txBody>
+      </p:sp>
+    </p:spTree>
+    <p:extLst>
+      <p:ext uri="{BB962C8B-B14F-4D97-AF65-F5344CB8AC3E}">
+        <p14:creationId xmlns:p14="http://schemas.microsoft.com/office/powerpoint/2010/main" val="2291184366"/>
       </p:ext>
     </p:extLst>
   </p:cSld>
@@ -2656,14 +2836,14 @@
               </a:spcAft>
               <a:buNone/>
             </a:pPr>
-            <a:endParaRPr/>
+            <a:endParaRPr dirty="0"/>
           </a:p>
         </p:txBody>
       </p:sp>
     </p:spTree>
     <p:extLst>
       <p:ext uri="{BB962C8B-B14F-4D97-AF65-F5344CB8AC3E}">
-        <p14:creationId xmlns:p14="http://schemas.microsoft.com/office/powerpoint/2010/main" val="1702971818"/>
+        <p14:creationId xmlns:p14="http://schemas.microsoft.com/office/powerpoint/2010/main" val="2122700934"/>
       </p:ext>
     </p:extLst>
   </p:cSld>
@@ -2765,14 +2945,14 @@
               </a:spcAft>
               <a:buNone/>
             </a:pPr>
-            <a:endParaRPr/>
+            <a:endParaRPr dirty="0"/>
           </a:p>
         </p:txBody>
       </p:sp>
     </p:spTree>
     <p:extLst>
       <p:ext uri="{BB962C8B-B14F-4D97-AF65-F5344CB8AC3E}">
-        <p14:creationId xmlns:p14="http://schemas.microsoft.com/office/powerpoint/2010/main" val="356808429"/>
+        <p14:creationId xmlns:p14="http://schemas.microsoft.com/office/powerpoint/2010/main" val="1519517479"/>
       </p:ext>
     </p:extLst>
   </p:cSld>
@@ -2881,7 +3061,7 @@
     </p:spTree>
     <p:extLst>
       <p:ext uri="{BB962C8B-B14F-4D97-AF65-F5344CB8AC3E}">
-        <p14:creationId xmlns:p14="http://schemas.microsoft.com/office/powerpoint/2010/main" val="297770978"/>
+        <p14:creationId xmlns:p14="http://schemas.microsoft.com/office/powerpoint/2010/main" val="1702971818"/>
       </p:ext>
     </p:extLst>
   </p:cSld>
@@ -2990,7 +3170,7 @@
     </p:spTree>
     <p:extLst>
       <p:ext uri="{BB962C8B-B14F-4D97-AF65-F5344CB8AC3E}">
-        <p14:creationId xmlns:p14="http://schemas.microsoft.com/office/powerpoint/2010/main" val="685667647"/>
+        <p14:creationId xmlns:p14="http://schemas.microsoft.com/office/powerpoint/2010/main" val="356808429"/>
       </p:ext>
     </p:extLst>
   </p:cSld>
@@ -3001,11 +3181,11 @@
 </file>
 
 <file path=ppt/notesSlides/notesSlide9.xml><?xml version="1.0" encoding="utf-8"?>
-<p:notes xmlns:a="http://schemas.openxmlformats.org/drawingml/2006/main" xmlns:r="http://schemas.openxmlformats.org/officeDocument/2006/relationships" xmlns:p="http://schemas.openxmlformats.org/presentationml/2006/main">
+<p:notes xmlns:a="http://schemas.openxmlformats.org/drawingml/2006/main" xmlns:r="http://schemas.openxmlformats.org/officeDocument/2006/relationships" xmlns:p="http://schemas.openxmlformats.org/presentationml/2006/main" showMasterSp="0" showMasterPhAnim="0">
   <p:cSld>
     <p:spTree>
       <p:nvGrpSpPr>
-        <p:cNvPr id="1" name=""/>
+        <p:cNvPr id="1" name="Shape 193"/>
         <p:cNvGrpSpPr/>
         <p:nvPr/>
       </p:nvGrpSpPr>
@@ -3019,12 +3199,12 @@
       </p:grpSpPr>
       <p:sp>
         <p:nvSpPr>
-          <p:cNvPr id="2" name="Slide Image Placeholder 1"/>
+          <p:cNvPr id="194" name="Google Shape;194;g35ed75ccf_057:notes"/>
           <p:cNvSpPr>
             <a:spLocks noGrp="1" noRot="1" noChangeAspect="1"/>
           </p:cNvSpPr>
           <p:nvPr>
-            <p:ph type="sldImg"/>
+            <p:ph type="sldImg" idx="2"/>
           </p:nvPr>
         </p:nvSpPr>
         <p:spPr>
@@ -3032,34 +3212,74 @@
             <a:off x="1143000" y="685800"/>
             <a:ext cx="4572000" cy="3429000"/>
           </a:xfrm>
+          <a:custGeom>
+            <a:avLst/>
+            <a:gdLst/>
+            <a:ahLst/>
+            <a:cxnLst/>
+            <a:rect l="l" t="t" r="r" b="b"/>
+            <a:pathLst>
+              <a:path w="120000" h="120000" extrusionOk="0">
+                <a:moveTo>
+                  <a:pt x="0" y="0"/>
+                </a:moveTo>
+                <a:lnTo>
+                  <a:pt x="120000" y="0"/>
+                </a:lnTo>
+                <a:lnTo>
+                  <a:pt x="120000" y="120000"/>
+                </a:lnTo>
+                <a:lnTo>
+                  <a:pt x="0" y="120000"/>
+                </a:lnTo>
+                <a:close/>
+              </a:path>
+            </a:pathLst>
+          </a:custGeom>
         </p:spPr>
       </p:sp>
       <p:sp>
         <p:nvSpPr>
-          <p:cNvPr id="3" name="Notes Placeholder 2"/>
-          <p:cNvSpPr>
+          <p:cNvPr id="195" name="Google Shape;195;g35ed75ccf_057:notes"/>
+          <p:cNvSpPr txBox="1">
             <a:spLocks noGrp="1"/>
           </p:cNvSpPr>
           <p:nvPr>
             <p:ph type="body" idx="1"/>
           </p:nvPr>
         </p:nvSpPr>
-        <p:spPr/>
+        <p:spPr>
+          <a:xfrm>
+            <a:off x="685800" y="4343400"/>
+            <a:ext cx="5486400" cy="4114800"/>
+          </a:xfrm>
+          <a:prstGeom prst="rect">
+            <a:avLst/>
+          </a:prstGeom>
+        </p:spPr>
         <p:txBody>
-          <a:bodyPr/>
+          <a:bodyPr spcFirstLastPara="1" wrap="square" lIns="91425" tIns="91425" rIns="91425" bIns="91425" anchor="t" anchorCtr="0">
+            <a:noAutofit/>
+          </a:bodyPr>
           <a:lstStyle/>
           <a:p>
-            <a:r>
-              <a:rPr lang="en-GB" dirty="0"/>
-              <a:t>So we think of it as…</a:t>
-            </a:r>
+            <a:pPr marL="0" lvl="0" indent="0" algn="l" rtl="0">
+              <a:spcBef>
+                <a:spcPts val="0"/>
+              </a:spcBef>
+              <a:spcAft>
+                <a:spcPts val="0"/>
+              </a:spcAft>
+              <a:buNone/>
+            </a:pPr>
+            <a:endParaRPr/>
           </a:p>
         </p:txBody>
       </p:sp>
     </p:spTree>
     <p:extLst>
       <p:ext uri="{BB962C8B-B14F-4D97-AF65-F5344CB8AC3E}">
-        <p14:creationId xmlns:p14="http://schemas.microsoft.com/office/powerpoint/2010/main" val="448274877"/>
+        <p14:creationId xmlns:p14="http://schemas.microsoft.com/office/powerpoint/2010/main" val="297770978"/>
       </p:ext>
     </p:extLst>
   </p:cSld>
@@ -7422,6 +7642,840 @@
   <p:cSld>
     <p:spTree>
       <p:nvGrpSpPr>
+        <p:cNvPr id="1" name="Shape 196"/>
+        <p:cNvGrpSpPr/>
+        <p:nvPr/>
+      </p:nvGrpSpPr>
+      <p:grpSpPr>
+        <a:xfrm>
+          <a:off x="0" y="0"/>
+          <a:ext cx="0" cy="0"/>
+          <a:chOff x="0" y="0"/>
+          <a:chExt cx="0" cy="0"/>
+        </a:xfrm>
+      </p:grpSpPr>
+      <p:sp>
+        <p:nvSpPr>
+          <p:cNvPr id="124" name="Google Shape;198;p29">
+            <a:extLst>
+              <a:ext uri="{FF2B5EF4-FFF2-40B4-BE49-F238E27FC236}">
+                <a16:creationId xmlns:a16="http://schemas.microsoft.com/office/drawing/2014/main" id="{79FB44A5-D80C-2141-8288-17FF0ED4B699}"/>
+              </a:ext>
+            </a:extLst>
+          </p:cNvPr>
+          <p:cNvSpPr txBox="1">
+            <a:spLocks/>
+          </p:cNvSpPr>
+          <p:nvPr/>
+        </p:nvSpPr>
+        <p:spPr>
+          <a:xfrm>
+            <a:off x="381000" y="2378535"/>
+            <a:ext cx="8331200" cy="4028390"/>
+          </a:xfrm>
+          <a:prstGeom prst="rect">
+            <a:avLst/>
+          </a:prstGeom>
+          <a:noFill/>
+          <a:ln>
+            <a:noFill/>
+          </a:ln>
+        </p:spPr>
+        <p:txBody>
+          <a:bodyPr spcFirstLastPara="1" wrap="square" lIns="121900" tIns="121900" rIns="121900" bIns="121900" anchor="t" anchorCtr="0">
+            <a:noAutofit/>
+          </a:bodyPr>
+          <a:lstStyle>
+            <a:defPPr marR="0" lvl="0" algn="l" rtl="0">
+              <a:lnSpc>
+                <a:spcPct val="100000"/>
+              </a:lnSpc>
+              <a:spcBef>
+                <a:spcPts val="0"/>
+              </a:spcBef>
+              <a:spcAft>
+                <a:spcPts val="0"/>
+              </a:spcAft>
+            </a:defPPr>
+            <a:lvl1pPr marL="457200" marR="0" lvl="0" indent="-330200" algn="l" rtl="0">
+              <a:lnSpc>
+                <a:spcPct val="100000"/>
+              </a:lnSpc>
+              <a:spcBef>
+                <a:spcPts val="600"/>
+              </a:spcBef>
+              <a:spcAft>
+                <a:spcPts val="0"/>
+              </a:spcAft>
+              <a:buClr>
+                <a:schemeClr val="dk1"/>
+              </a:buClr>
+              <a:buSzPts val="1600"/>
+              <a:buFont typeface="PT Serif"/>
+              <a:buChar char="▣"/>
+              <a:defRPr sz="1600" b="0" i="0" u="none" strike="noStrike" cap="none">
+                <a:solidFill>
+                  <a:schemeClr val="dk1"/>
+                </a:solidFill>
+                <a:latin typeface="PT Serif"/>
+                <a:ea typeface="PT Serif"/>
+                <a:cs typeface="PT Serif"/>
+                <a:sym typeface="PT Serif"/>
+              </a:defRPr>
+            </a:lvl1pPr>
+            <a:lvl2pPr marL="914400" marR="0" lvl="1" indent="-330200" algn="l" rtl="0">
+              <a:lnSpc>
+                <a:spcPct val="100000"/>
+              </a:lnSpc>
+              <a:spcBef>
+                <a:spcPts val="0"/>
+              </a:spcBef>
+              <a:spcAft>
+                <a:spcPts val="0"/>
+              </a:spcAft>
+              <a:buClr>
+                <a:schemeClr val="dk1"/>
+              </a:buClr>
+              <a:buSzPts val="1600"/>
+              <a:buFont typeface="PT Serif"/>
+              <a:buChar char="○"/>
+              <a:defRPr sz="1600" b="0" i="0" u="none" strike="noStrike" cap="none">
+                <a:solidFill>
+                  <a:schemeClr val="dk1"/>
+                </a:solidFill>
+                <a:latin typeface="PT Serif"/>
+                <a:ea typeface="PT Serif"/>
+                <a:cs typeface="PT Serif"/>
+                <a:sym typeface="PT Serif"/>
+              </a:defRPr>
+            </a:lvl2pPr>
+            <a:lvl3pPr marL="1371600" marR="0" lvl="2" indent="-330200" algn="l" rtl="0">
+              <a:lnSpc>
+                <a:spcPct val="100000"/>
+              </a:lnSpc>
+              <a:spcBef>
+                <a:spcPts val="0"/>
+              </a:spcBef>
+              <a:spcAft>
+                <a:spcPts val="0"/>
+              </a:spcAft>
+              <a:buClr>
+                <a:schemeClr val="dk1"/>
+              </a:buClr>
+              <a:buSzPts val="1600"/>
+              <a:buFont typeface="PT Serif"/>
+              <a:buChar char="■"/>
+              <a:defRPr sz="1600" b="0" i="0" u="none" strike="noStrike" cap="none">
+                <a:solidFill>
+                  <a:schemeClr val="dk1"/>
+                </a:solidFill>
+                <a:latin typeface="PT Serif"/>
+                <a:ea typeface="PT Serif"/>
+                <a:cs typeface="PT Serif"/>
+                <a:sym typeface="PT Serif"/>
+              </a:defRPr>
+            </a:lvl3pPr>
+            <a:lvl4pPr marL="1828800" marR="0" lvl="3" indent="-330200" algn="l" rtl="0">
+              <a:lnSpc>
+                <a:spcPct val="100000"/>
+              </a:lnSpc>
+              <a:spcBef>
+                <a:spcPts val="0"/>
+              </a:spcBef>
+              <a:spcAft>
+                <a:spcPts val="0"/>
+              </a:spcAft>
+              <a:buClr>
+                <a:schemeClr val="dk1"/>
+              </a:buClr>
+              <a:buSzPts val="1600"/>
+              <a:buFont typeface="PT Serif"/>
+              <a:buChar char="●"/>
+              <a:defRPr sz="1600" b="0" i="0" u="none" strike="noStrike" cap="none">
+                <a:solidFill>
+                  <a:schemeClr val="dk1"/>
+                </a:solidFill>
+                <a:latin typeface="PT Serif"/>
+                <a:ea typeface="PT Serif"/>
+                <a:cs typeface="PT Serif"/>
+                <a:sym typeface="PT Serif"/>
+              </a:defRPr>
+            </a:lvl4pPr>
+            <a:lvl5pPr marL="2286000" marR="0" lvl="4" indent="-330200" algn="l" rtl="0">
+              <a:lnSpc>
+                <a:spcPct val="100000"/>
+              </a:lnSpc>
+              <a:spcBef>
+                <a:spcPts val="0"/>
+              </a:spcBef>
+              <a:spcAft>
+                <a:spcPts val="0"/>
+              </a:spcAft>
+              <a:buClr>
+                <a:schemeClr val="dk1"/>
+              </a:buClr>
+              <a:buSzPts val="1600"/>
+              <a:buFont typeface="PT Serif"/>
+              <a:buChar char="○"/>
+              <a:defRPr sz="1600" b="0" i="0" u="none" strike="noStrike" cap="none">
+                <a:solidFill>
+                  <a:schemeClr val="dk1"/>
+                </a:solidFill>
+                <a:latin typeface="PT Serif"/>
+                <a:ea typeface="PT Serif"/>
+                <a:cs typeface="PT Serif"/>
+                <a:sym typeface="PT Serif"/>
+              </a:defRPr>
+            </a:lvl5pPr>
+            <a:lvl6pPr marL="2743200" marR="0" lvl="5" indent="-330200" algn="l" rtl="0">
+              <a:lnSpc>
+                <a:spcPct val="100000"/>
+              </a:lnSpc>
+              <a:spcBef>
+                <a:spcPts val="0"/>
+              </a:spcBef>
+              <a:spcAft>
+                <a:spcPts val="0"/>
+              </a:spcAft>
+              <a:buClr>
+                <a:schemeClr val="dk1"/>
+              </a:buClr>
+              <a:buSzPts val="1600"/>
+              <a:buFont typeface="PT Serif"/>
+              <a:buChar char="■"/>
+              <a:defRPr sz="1600" b="0" i="0" u="none" strike="noStrike" cap="none">
+                <a:solidFill>
+                  <a:schemeClr val="dk1"/>
+                </a:solidFill>
+                <a:latin typeface="PT Serif"/>
+                <a:ea typeface="PT Serif"/>
+                <a:cs typeface="PT Serif"/>
+                <a:sym typeface="PT Serif"/>
+              </a:defRPr>
+            </a:lvl6pPr>
+            <a:lvl7pPr marL="3200400" marR="0" lvl="6" indent="-330200" algn="l" rtl="0">
+              <a:lnSpc>
+                <a:spcPct val="100000"/>
+              </a:lnSpc>
+              <a:spcBef>
+                <a:spcPts val="0"/>
+              </a:spcBef>
+              <a:spcAft>
+                <a:spcPts val="0"/>
+              </a:spcAft>
+              <a:buClr>
+                <a:schemeClr val="dk1"/>
+              </a:buClr>
+              <a:buSzPts val="1600"/>
+              <a:buFont typeface="PT Serif"/>
+              <a:buChar char="●"/>
+              <a:defRPr sz="1600" b="0" i="0" u="none" strike="noStrike" cap="none">
+                <a:solidFill>
+                  <a:schemeClr val="dk1"/>
+                </a:solidFill>
+                <a:latin typeface="PT Serif"/>
+                <a:ea typeface="PT Serif"/>
+                <a:cs typeface="PT Serif"/>
+                <a:sym typeface="PT Serif"/>
+              </a:defRPr>
+            </a:lvl7pPr>
+            <a:lvl8pPr marL="3657600" marR="0" lvl="7" indent="-330200" algn="l" rtl="0">
+              <a:lnSpc>
+                <a:spcPct val="100000"/>
+              </a:lnSpc>
+              <a:spcBef>
+                <a:spcPts val="0"/>
+              </a:spcBef>
+              <a:spcAft>
+                <a:spcPts val="0"/>
+              </a:spcAft>
+              <a:buClr>
+                <a:schemeClr val="dk1"/>
+              </a:buClr>
+              <a:buSzPts val="1600"/>
+              <a:buFont typeface="PT Serif"/>
+              <a:buChar char="○"/>
+              <a:defRPr sz="1600" b="0" i="0" u="none" strike="noStrike" cap="none">
+                <a:solidFill>
+                  <a:schemeClr val="dk1"/>
+                </a:solidFill>
+                <a:latin typeface="PT Serif"/>
+                <a:ea typeface="PT Serif"/>
+                <a:cs typeface="PT Serif"/>
+                <a:sym typeface="PT Serif"/>
+              </a:defRPr>
+            </a:lvl8pPr>
+            <a:lvl9pPr marL="4114800" marR="0" lvl="8" indent="-330200" algn="l" rtl="0">
+              <a:lnSpc>
+                <a:spcPct val="100000"/>
+              </a:lnSpc>
+              <a:spcBef>
+                <a:spcPts val="0"/>
+              </a:spcBef>
+              <a:spcAft>
+                <a:spcPts val="0"/>
+              </a:spcAft>
+              <a:buClr>
+                <a:schemeClr val="dk1"/>
+              </a:buClr>
+              <a:buSzPts val="1600"/>
+              <a:buFont typeface="PT Serif"/>
+              <a:buChar char="■"/>
+              <a:defRPr sz="1600" b="0" i="0" u="none" strike="noStrike" cap="none">
+                <a:solidFill>
+                  <a:schemeClr val="dk1"/>
+                </a:solidFill>
+                <a:latin typeface="PT Serif"/>
+                <a:ea typeface="PT Serif"/>
+                <a:cs typeface="PT Serif"/>
+                <a:sym typeface="PT Serif"/>
+              </a:defRPr>
+            </a:lvl9pPr>
+          </a:lstStyle>
+          <a:p>
+            <a:pPr marL="0" indent="0" algn="ctr">
+              <a:buNone/>
+            </a:pPr>
+            <a:r>
+              <a:rPr lang="en-US" sz="4800" b="1" i="1" dirty="0">
+                <a:latin typeface="Playfair Display"/>
+                <a:ea typeface="Playfair Display"/>
+                <a:cs typeface="Playfair Display"/>
+                <a:sym typeface="Playfair Display"/>
+              </a:rPr>
+              <a:t>Reality is Optional</a:t>
+            </a:r>
+          </a:p>
+          <a:p>
+            <a:pPr marL="0" indent="0" algn="ctr">
+              <a:buNone/>
+            </a:pPr>
+            <a:r>
+              <a:rPr lang="en-US" sz="4000" dirty="0"/>
+              <a:t>You only need to use realistic situations when they are also convenient. Otherwise, don’t</a:t>
+            </a:r>
+          </a:p>
+          <a:p>
+            <a:pPr marL="0" indent="0" algn="ctr">
+              <a:buNone/>
+            </a:pPr>
+            <a:r>
+              <a:rPr lang="en-US" sz="3600" i="1" strike="sngStrike" dirty="0">
+                <a:solidFill>
+                  <a:srgbClr val="851300"/>
+                </a:solidFill>
+              </a:rPr>
+              <a:t>Password = 2FX_V?Az8Wm/9CuZ%</a:t>
+            </a:r>
+          </a:p>
+          <a:p>
+            <a:pPr marL="0" indent="0" algn="ctr">
+              <a:buNone/>
+            </a:pPr>
+            <a:r>
+              <a:rPr lang="en-US" sz="3600" i="1" dirty="0">
+                <a:solidFill>
+                  <a:srgbClr val="00612B"/>
+                </a:solidFill>
+              </a:rPr>
+              <a:t>Password = Password</a:t>
+            </a:r>
+          </a:p>
+        </p:txBody>
+      </p:sp>
+      <p:pic>
+        <p:nvPicPr>
+          <p:cNvPr id="77" name="Picture 4" descr="How to Draw a Scarecrow - Really Easy Drawing Tutorial">
+            <a:extLst>
+              <a:ext uri="{FF2B5EF4-FFF2-40B4-BE49-F238E27FC236}">
+                <a16:creationId xmlns:a16="http://schemas.microsoft.com/office/drawing/2014/main" id="{F4787572-0CFA-7844-A7CA-D4EC97BE0F20}"/>
+              </a:ext>
+            </a:extLst>
+          </p:cNvPr>
+          <p:cNvPicPr>
+            <a:picLocks noChangeAspect="1" noChangeArrowheads="1"/>
+          </p:cNvPicPr>
+          <p:nvPr/>
+        </p:nvPicPr>
+        <p:blipFill>
+          <a:blip r:embed="rId3">
+            <a:extLst>
+              <a:ext uri="{28A0092B-C50C-407E-A947-70E740481C1C}">
+                <a14:useLocalDpi xmlns:a14="http://schemas.microsoft.com/office/drawing/2010/main" val="0"/>
+              </a:ext>
+            </a:extLst>
+          </a:blip>
+          <a:srcRect/>
+          <a:stretch>
+            <a:fillRect/>
+          </a:stretch>
+        </p:blipFill>
+        <p:spPr bwMode="auto">
+          <a:xfrm>
+            <a:off x="3740132" y="1179025"/>
+            <a:ext cx="1612936" cy="1607968"/>
+          </a:xfrm>
+          <a:prstGeom prst="rect">
+            <a:avLst/>
+          </a:prstGeom>
+          <a:noFill/>
+          <a:extLst>
+            <a:ext uri="{909E8E84-426E-40DD-AFC4-6F175D3DCCD1}">
+              <a14:hiddenFill xmlns:a14="http://schemas.microsoft.com/office/drawing/2010/main">
+                <a:solidFill>
+                  <a:srgbClr val="FFFFFF"/>
+                </a:solidFill>
+              </a14:hiddenFill>
+            </a:ext>
+          </a:extLst>
+        </p:spPr>
+      </p:pic>
+      <p:sp>
+        <p:nvSpPr>
+          <p:cNvPr id="10" name="Google Shape;197;p29">
+            <a:extLst>
+              <a:ext uri="{FF2B5EF4-FFF2-40B4-BE49-F238E27FC236}">
+                <a16:creationId xmlns:a16="http://schemas.microsoft.com/office/drawing/2014/main" id="{D4175E88-A14A-347F-09B1-E2E29172EE6D}"/>
+              </a:ext>
+            </a:extLst>
+          </p:cNvPr>
+          <p:cNvSpPr txBox="1">
+            <a:spLocks noGrp="1"/>
+          </p:cNvSpPr>
+          <p:nvPr>
+            <p:ph type="title"/>
+          </p:nvPr>
+        </p:nvSpPr>
+        <p:spPr>
+          <a:xfrm>
+            <a:off x="1327016" y="451075"/>
+            <a:ext cx="6439168" cy="1016800"/>
+          </a:xfrm>
+          <a:prstGeom prst="rect">
+            <a:avLst/>
+          </a:prstGeom>
+        </p:spPr>
+        <p:txBody>
+          <a:bodyPr spcFirstLastPara="1" wrap="square" lIns="121900" tIns="121900" rIns="121900" bIns="121900" anchor="ctr" anchorCtr="0">
+            <a:noAutofit/>
+          </a:bodyPr>
+          <a:lstStyle/>
+          <a:p>
+            <a:r>
+              <a:rPr lang="en" dirty="0"/>
+              <a:t>Rules for Test Scenarios</a:t>
+            </a:r>
+            <a:br>
+              <a:rPr lang="en" dirty="0"/>
+            </a:br>
+            <a:r>
+              <a:rPr lang="en" dirty="0"/>
+              <a:t>(6/6)</a:t>
+            </a:r>
+            <a:endParaRPr dirty="0"/>
+          </a:p>
+        </p:txBody>
+      </p:sp>
+    </p:spTree>
+    <p:extLst>
+      <p:ext uri="{BB962C8B-B14F-4D97-AF65-F5344CB8AC3E}">
+        <p14:creationId xmlns:p14="http://schemas.microsoft.com/office/powerpoint/2010/main" val="651455976"/>
+      </p:ext>
+    </p:extLst>
+  </p:cSld>
+  <p:clrMapOvr>
+    <a:masterClrMapping/>
+  </p:clrMapOvr>
+</p:sld>
+</file>
+
+<file path=ppt/slides/slide11.xml><?xml version="1.0" encoding="utf-8"?>
+<p:sld xmlns:a="http://schemas.openxmlformats.org/drawingml/2006/main" xmlns:r="http://schemas.openxmlformats.org/officeDocument/2006/relationships" xmlns:p="http://schemas.openxmlformats.org/presentationml/2006/main">
+  <p:cSld>
+    <p:spTree>
+      <p:nvGrpSpPr>
+        <p:cNvPr id="1" name=""/>
+        <p:cNvGrpSpPr/>
+        <p:nvPr/>
+      </p:nvGrpSpPr>
+      <p:grpSpPr>
+        <a:xfrm>
+          <a:off x="0" y="0"/>
+          <a:ext cx="0" cy="0"/>
+          <a:chOff x="0" y="0"/>
+          <a:chExt cx="0" cy="0"/>
+        </a:xfrm>
+      </p:grpSpPr>
+      <p:sp>
+        <p:nvSpPr>
+          <p:cNvPr id="2" name="Title 1">
+            <a:extLst>
+              <a:ext uri="{FF2B5EF4-FFF2-40B4-BE49-F238E27FC236}">
+                <a16:creationId xmlns:a16="http://schemas.microsoft.com/office/drawing/2014/main" id="{EDC1A474-B4B6-5E43-94C1-D5AF01A35276}"/>
+              </a:ext>
+            </a:extLst>
+          </p:cNvPr>
+          <p:cNvSpPr>
+            <a:spLocks noGrp="1"/>
+          </p:cNvSpPr>
+          <p:nvPr>
+            <p:ph type="ctrTitle" idx="4294967295"/>
+          </p:nvPr>
+        </p:nvSpPr>
+        <p:spPr>
+          <a:xfrm>
+            <a:off x="1315366" y="1671320"/>
+            <a:ext cx="6284667" cy="4945380"/>
+          </a:xfrm>
+        </p:spPr>
+        <p:txBody>
+          <a:bodyPr/>
+          <a:lstStyle/>
+          <a:p>
+            <a:r>
+              <a:rPr lang="en-GB" sz="13800" dirty="0">
+                <a:solidFill>
+                  <a:schemeClr val="tx1"/>
+                </a:solidFill>
+              </a:rPr>
+              <a:t>Do</a:t>
+            </a:r>
+            <a:br>
+              <a:rPr lang="en-GB" sz="13800" dirty="0">
+                <a:solidFill>
+                  <a:schemeClr val="tx1"/>
+                </a:solidFill>
+              </a:rPr>
+            </a:br>
+            <a:r>
+              <a:rPr lang="en-GB" sz="13800" dirty="0">
+                <a:solidFill>
+                  <a:schemeClr val="tx1"/>
+                </a:solidFill>
+              </a:rPr>
+              <a:t>Verify</a:t>
+            </a:r>
+          </a:p>
+        </p:txBody>
+      </p:sp>
+      <p:sp>
+        <p:nvSpPr>
+          <p:cNvPr id="4" name="Google Shape;198;p29">
+            <a:extLst>
+              <a:ext uri="{FF2B5EF4-FFF2-40B4-BE49-F238E27FC236}">
+                <a16:creationId xmlns:a16="http://schemas.microsoft.com/office/drawing/2014/main" id="{E5F6E51F-EC3D-D67A-2696-E89A7E17D042}"/>
+              </a:ext>
+            </a:extLst>
+          </p:cNvPr>
+          <p:cNvSpPr txBox="1">
+            <a:spLocks/>
+          </p:cNvSpPr>
+          <p:nvPr/>
+        </p:nvSpPr>
+        <p:spPr>
+          <a:xfrm>
+            <a:off x="292099" y="549852"/>
+            <a:ext cx="8331200" cy="1121468"/>
+          </a:xfrm>
+          <a:prstGeom prst="rect">
+            <a:avLst/>
+          </a:prstGeom>
+          <a:noFill/>
+          <a:ln>
+            <a:noFill/>
+          </a:ln>
+        </p:spPr>
+        <p:txBody>
+          <a:bodyPr spcFirstLastPara="1" wrap="square" lIns="121900" tIns="121900" rIns="121900" bIns="121900" anchor="t" anchorCtr="0">
+            <a:noAutofit/>
+          </a:bodyPr>
+          <a:lstStyle>
+            <a:defPPr marR="0" lvl="0" algn="l" rtl="0">
+              <a:lnSpc>
+                <a:spcPct val="100000"/>
+              </a:lnSpc>
+              <a:spcBef>
+                <a:spcPts val="0"/>
+              </a:spcBef>
+              <a:spcAft>
+                <a:spcPts val="0"/>
+              </a:spcAft>
+            </a:defPPr>
+            <a:lvl1pPr marL="457200" marR="0" lvl="0" indent="-330200" algn="l" rtl="0">
+              <a:lnSpc>
+                <a:spcPct val="100000"/>
+              </a:lnSpc>
+              <a:spcBef>
+                <a:spcPts val="600"/>
+              </a:spcBef>
+              <a:spcAft>
+                <a:spcPts val="0"/>
+              </a:spcAft>
+              <a:buClr>
+                <a:schemeClr val="dk1"/>
+              </a:buClr>
+              <a:buSzPts val="1600"/>
+              <a:buFont typeface="PT Serif"/>
+              <a:buChar char="▣"/>
+              <a:defRPr sz="1600" b="0" i="0" u="none" strike="noStrike" cap="none">
+                <a:solidFill>
+                  <a:schemeClr val="dk1"/>
+                </a:solidFill>
+                <a:latin typeface="PT Serif"/>
+                <a:ea typeface="PT Serif"/>
+                <a:cs typeface="PT Serif"/>
+                <a:sym typeface="PT Serif"/>
+              </a:defRPr>
+            </a:lvl1pPr>
+            <a:lvl2pPr marL="914400" marR="0" lvl="1" indent="-330200" algn="l" rtl="0">
+              <a:lnSpc>
+                <a:spcPct val="100000"/>
+              </a:lnSpc>
+              <a:spcBef>
+                <a:spcPts val="0"/>
+              </a:spcBef>
+              <a:spcAft>
+                <a:spcPts val="0"/>
+              </a:spcAft>
+              <a:buClr>
+                <a:schemeClr val="dk1"/>
+              </a:buClr>
+              <a:buSzPts val="1600"/>
+              <a:buFont typeface="PT Serif"/>
+              <a:buChar char="○"/>
+              <a:defRPr sz="1600" b="0" i="0" u="none" strike="noStrike" cap="none">
+                <a:solidFill>
+                  <a:schemeClr val="dk1"/>
+                </a:solidFill>
+                <a:latin typeface="PT Serif"/>
+                <a:ea typeface="PT Serif"/>
+                <a:cs typeface="PT Serif"/>
+                <a:sym typeface="PT Serif"/>
+              </a:defRPr>
+            </a:lvl2pPr>
+            <a:lvl3pPr marL="1371600" marR="0" lvl="2" indent="-330200" algn="l" rtl="0">
+              <a:lnSpc>
+                <a:spcPct val="100000"/>
+              </a:lnSpc>
+              <a:spcBef>
+                <a:spcPts val="0"/>
+              </a:spcBef>
+              <a:spcAft>
+                <a:spcPts val="0"/>
+              </a:spcAft>
+              <a:buClr>
+                <a:schemeClr val="dk1"/>
+              </a:buClr>
+              <a:buSzPts val="1600"/>
+              <a:buFont typeface="PT Serif"/>
+              <a:buChar char="■"/>
+              <a:defRPr sz="1600" b="0" i="0" u="none" strike="noStrike" cap="none">
+                <a:solidFill>
+                  <a:schemeClr val="dk1"/>
+                </a:solidFill>
+                <a:latin typeface="PT Serif"/>
+                <a:ea typeface="PT Serif"/>
+                <a:cs typeface="PT Serif"/>
+                <a:sym typeface="PT Serif"/>
+              </a:defRPr>
+            </a:lvl3pPr>
+            <a:lvl4pPr marL="1828800" marR="0" lvl="3" indent="-330200" algn="l" rtl="0">
+              <a:lnSpc>
+                <a:spcPct val="100000"/>
+              </a:lnSpc>
+              <a:spcBef>
+                <a:spcPts val="0"/>
+              </a:spcBef>
+              <a:spcAft>
+                <a:spcPts val="0"/>
+              </a:spcAft>
+              <a:buClr>
+                <a:schemeClr val="dk1"/>
+              </a:buClr>
+              <a:buSzPts val="1600"/>
+              <a:buFont typeface="PT Serif"/>
+              <a:buChar char="●"/>
+              <a:defRPr sz="1600" b="0" i="0" u="none" strike="noStrike" cap="none">
+                <a:solidFill>
+                  <a:schemeClr val="dk1"/>
+                </a:solidFill>
+                <a:latin typeface="PT Serif"/>
+                <a:ea typeface="PT Serif"/>
+                <a:cs typeface="PT Serif"/>
+                <a:sym typeface="PT Serif"/>
+              </a:defRPr>
+            </a:lvl4pPr>
+            <a:lvl5pPr marL="2286000" marR="0" lvl="4" indent="-330200" algn="l" rtl="0">
+              <a:lnSpc>
+                <a:spcPct val="100000"/>
+              </a:lnSpc>
+              <a:spcBef>
+                <a:spcPts val="0"/>
+              </a:spcBef>
+              <a:spcAft>
+                <a:spcPts val="0"/>
+              </a:spcAft>
+              <a:buClr>
+                <a:schemeClr val="dk1"/>
+              </a:buClr>
+              <a:buSzPts val="1600"/>
+              <a:buFont typeface="PT Serif"/>
+              <a:buChar char="○"/>
+              <a:defRPr sz="1600" b="0" i="0" u="none" strike="noStrike" cap="none">
+                <a:solidFill>
+                  <a:schemeClr val="dk1"/>
+                </a:solidFill>
+                <a:latin typeface="PT Serif"/>
+                <a:ea typeface="PT Serif"/>
+                <a:cs typeface="PT Serif"/>
+                <a:sym typeface="PT Serif"/>
+              </a:defRPr>
+            </a:lvl5pPr>
+            <a:lvl6pPr marL="2743200" marR="0" lvl="5" indent="-330200" algn="l" rtl="0">
+              <a:lnSpc>
+                <a:spcPct val="100000"/>
+              </a:lnSpc>
+              <a:spcBef>
+                <a:spcPts val="0"/>
+              </a:spcBef>
+              <a:spcAft>
+                <a:spcPts val="0"/>
+              </a:spcAft>
+              <a:buClr>
+                <a:schemeClr val="dk1"/>
+              </a:buClr>
+              <a:buSzPts val="1600"/>
+              <a:buFont typeface="PT Serif"/>
+              <a:buChar char="■"/>
+              <a:defRPr sz="1600" b="0" i="0" u="none" strike="noStrike" cap="none">
+                <a:solidFill>
+                  <a:schemeClr val="dk1"/>
+                </a:solidFill>
+                <a:latin typeface="PT Serif"/>
+                <a:ea typeface="PT Serif"/>
+                <a:cs typeface="PT Serif"/>
+                <a:sym typeface="PT Serif"/>
+              </a:defRPr>
+            </a:lvl6pPr>
+            <a:lvl7pPr marL="3200400" marR="0" lvl="6" indent="-330200" algn="l" rtl="0">
+              <a:lnSpc>
+                <a:spcPct val="100000"/>
+              </a:lnSpc>
+              <a:spcBef>
+                <a:spcPts val="0"/>
+              </a:spcBef>
+              <a:spcAft>
+                <a:spcPts val="0"/>
+              </a:spcAft>
+              <a:buClr>
+                <a:schemeClr val="dk1"/>
+              </a:buClr>
+              <a:buSzPts val="1600"/>
+              <a:buFont typeface="PT Serif"/>
+              <a:buChar char="●"/>
+              <a:defRPr sz="1600" b="0" i="0" u="none" strike="noStrike" cap="none">
+                <a:solidFill>
+                  <a:schemeClr val="dk1"/>
+                </a:solidFill>
+                <a:latin typeface="PT Serif"/>
+                <a:ea typeface="PT Serif"/>
+                <a:cs typeface="PT Serif"/>
+                <a:sym typeface="PT Serif"/>
+              </a:defRPr>
+            </a:lvl7pPr>
+            <a:lvl8pPr marL="3657600" marR="0" lvl="7" indent="-330200" algn="l" rtl="0">
+              <a:lnSpc>
+                <a:spcPct val="100000"/>
+              </a:lnSpc>
+              <a:spcBef>
+                <a:spcPts val="0"/>
+              </a:spcBef>
+              <a:spcAft>
+                <a:spcPts val="0"/>
+              </a:spcAft>
+              <a:buClr>
+                <a:schemeClr val="dk1"/>
+              </a:buClr>
+              <a:buSzPts val="1600"/>
+              <a:buFont typeface="PT Serif"/>
+              <a:buChar char="○"/>
+              <a:defRPr sz="1600" b="0" i="0" u="none" strike="noStrike" cap="none">
+                <a:solidFill>
+                  <a:schemeClr val="dk1"/>
+                </a:solidFill>
+                <a:latin typeface="PT Serif"/>
+                <a:ea typeface="PT Serif"/>
+                <a:cs typeface="PT Serif"/>
+                <a:sym typeface="PT Serif"/>
+              </a:defRPr>
+            </a:lvl8pPr>
+            <a:lvl9pPr marL="4114800" marR="0" lvl="8" indent="-330200" algn="l" rtl="0">
+              <a:lnSpc>
+                <a:spcPct val="100000"/>
+              </a:lnSpc>
+              <a:spcBef>
+                <a:spcPts val="0"/>
+              </a:spcBef>
+              <a:spcAft>
+                <a:spcPts val="0"/>
+              </a:spcAft>
+              <a:buClr>
+                <a:schemeClr val="dk1"/>
+              </a:buClr>
+              <a:buSzPts val="1600"/>
+              <a:buFont typeface="PT Serif"/>
+              <a:buChar char="■"/>
+              <a:defRPr sz="1600" b="0" i="0" u="none" strike="noStrike" cap="none">
+                <a:solidFill>
+                  <a:schemeClr val="dk1"/>
+                </a:solidFill>
+                <a:latin typeface="PT Serif"/>
+                <a:ea typeface="PT Serif"/>
+                <a:cs typeface="PT Serif"/>
+                <a:sym typeface="PT Serif"/>
+              </a:defRPr>
+            </a:lvl9pPr>
+          </a:lstStyle>
+          <a:p>
+            <a:pPr marL="0" indent="0" algn="ctr">
+              <a:buNone/>
+            </a:pPr>
+            <a:r>
+              <a:rPr lang="en-US" sz="4800" b="1" i="1" dirty="0">
+                <a:solidFill>
+                  <a:schemeClr val="tx1">
+                    <a:lumMod val="50000"/>
+                    <a:lumOff val="50000"/>
+                  </a:schemeClr>
+                </a:solidFill>
+                <a:latin typeface="Playfair Display"/>
+                <a:ea typeface="Playfair Display"/>
+                <a:cs typeface="Playfair Display"/>
+                <a:sym typeface="Playfair Display"/>
+              </a:rPr>
+              <a:t>Parts of a Test</a:t>
+            </a:r>
+          </a:p>
+        </p:txBody>
+      </p:sp>
+    </p:spTree>
+    <p:extLst>
+      <p:ext uri="{BB962C8B-B14F-4D97-AF65-F5344CB8AC3E}">
+        <p14:creationId xmlns:p14="http://schemas.microsoft.com/office/powerpoint/2010/main" val="1475005755"/>
+      </p:ext>
+    </p:extLst>
+  </p:cSld>
+  <p:clrMapOvr>
+    <a:masterClrMapping/>
+  </p:clrMapOvr>
+</p:sld>
+</file>
+
+<file path=ppt/slides/slide12.xml><?xml version="1.0" encoding="utf-8"?>
+<p:sld xmlns:a="http://schemas.openxmlformats.org/drawingml/2006/main" xmlns:r="http://schemas.openxmlformats.org/officeDocument/2006/relationships" xmlns:p="http://schemas.openxmlformats.org/presentationml/2006/main">
+  <p:cSld>
+    <p:spTree>
+      <p:nvGrpSpPr>
         <p:cNvPr id="1" name="Shape 73"/>
         <p:cNvGrpSpPr/>
         <p:nvPr/>
@@ -8798,7 +9852,7 @@
 </p:sld>
 </file>
 
-<file path=ppt/slides/slide11.xml><?xml version="1.0" encoding="utf-8"?>
+<file path=ppt/slides/slide13.xml><?xml version="1.0" encoding="utf-8"?>
 <p:sld xmlns:a="http://schemas.openxmlformats.org/drawingml/2006/main" xmlns:r="http://schemas.openxmlformats.org/officeDocument/2006/relationships" xmlns:p="http://schemas.openxmlformats.org/presentationml/2006/main">
   <p:cSld>
     <p:spTree>
@@ -9554,7 +10608,7 @@
 </p:sld>
 </file>
 
-<file path=ppt/slides/slide12.xml><?xml version="1.0" encoding="utf-8"?>
+<file path=ppt/slides/slide14.xml><?xml version="1.0" encoding="utf-8"?>
 <p:sld xmlns:a="http://schemas.openxmlformats.org/drawingml/2006/main" xmlns:r="http://schemas.openxmlformats.org/officeDocument/2006/relationships" xmlns:p="http://schemas.openxmlformats.org/presentationml/2006/main">
   <p:cSld>
     <p:spTree>
@@ -11092,7 +12146,7 @@
 </p:sld>
 </file>
 
-<file path=ppt/slides/slide13.xml><?xml version="1.0" encoding="utf-8"?>
+<file path=ppt/slides/slide15.xml><?xml version="1.0" encoding="utf-8"?>
 <p:sld xmlns:a="http://schemas.openxmlformats.org/drawingml/2006/main" xmlns:r="http://schemas.openxmlformats.org/officeDocument/2006/relationships" xmlns:p="http://schemas.openxmlformats.org/presentationml/2006/main">
   <p:cSld>
     <p:spTree>
@@ -11804,7 +12858,7 @@
 </p:sld>
 </file>
 
-<file path=ppt/slides/slide14.xml><?xml version="1.0" encoding="utf-8"?>
+<file path=ppt/slides/slide16.xml><?xml version="1.0" encoding="utf-8"?>
 <p:sld xmlns:a="http://schemas.openxmlformats.org/drawingml/2006/main" xmlns:r="http://schemas.openxmlformats.org/officeDocument/2006/relationships" xmlns:p="http://schemas.openxmlformats.org/presentationml/2006/main">
   <p:cSld>
     <p:spTree>
@@ -12272,7 +13326,7 @@
 </p:sld>
 </file>
 
-<file path=ppt/slides/slide15.xml><?xml version="1.0" encoding="utf-8"?>
+<file path=ppt/slides/slide17.xml><?xml version="1.0" encoding="utf-8"?>
 <p:sld xmlns:a="http://schemas.openxmlformats.org/drawingml/2006/main" xmlns:r="http://schemas.openxmlformats.org/officeDocument/2006/relationships" xmlns:p="http://schemas.openxmlformats.org/presentationml/2006/main">
   <p:cSld>
     <p:spTree>
@@ -14469,7 +15523,7 @@
 </p:sld>
 </file>
 
-<file path=ppt/slides/slide16.xml><?xml version="1.0" encoding="utf-8"?>
+<file path=ppt/slides/slide18.xml><?xml version="1.0" encoding="utf-8"?>
 <p:sld xmlns:a="http://schemas.openxmlformats.org/drawingml/2006/main" xmlns:r="http://schemas.openxmlformats.org/officeDocument/2006/relationships" xmlns:p="http://schemas.openxmlformats.org/presentationml/2006/main">
   <p:cSld>
     <p:spTree>
@@ -15511,7 +16565,7 @@
 </p:sld>
 </file>
 
-<file path=ppt/slides/slide17.xml><?xml version="1.0" encoding="utf-8"?>
+<file path=ppt/slides/slide19.xml><?xml version="1.0" encoding="utf-8"?>
 <p:sld xmlns:a="http://schemas.openxmlformats.org/drawingml/2006/main" xmlns:r="http://schemas.openxmlformats.org/officeDocument/2006/relationships" xmlns:p="http://schemas.openxmlformats.org/presentationml/2006/main">
   <p:cSld>
     <p:spTree>
@@ -16430,7 +17484,145 @@
 </p:sld>
 </file>
 
-<file path=ppt/slides/slide18.xml><?xml version="1.0" encoding="utf-8"?>
+<file path=ppt/slides/slide2.xml><?xml version="1.0" encoding="utf-8"?>
+<p:sld xmlns:a="http://schemas.openxmlformats.org/drawingml/2006/main" xmlns:r="http://schemas.openxmlformats.org/officeDocument/2006/relationships" xmlns:p="http://schemas.openxmlformats.org/presentationml/2006/main">
+  <p:cSld>
+    <p:spTree>
+      <p:nvGrpSpPr>
+        <p:cNvPr id="1" name="Shape 86"/>
+        <p:cNvGrpSpPr/>
+        <p:nvPr/>
+      </p:nvGrpSpPr>
+      <p:grpSpPr>
+        <a:xfrm>
+          <a:off x="0" y="0"/>
+          <a:ext cx="0" cy="0"/>
+          <a:chOff x="0" y="0"/>
+          <a:chExt cx="0" cy="0"/>
+        </a:xfrm>
+      </p:grpSpPr>
+      <p:sp>
+        <p:nvSpPr>
+          <p:cNvPr id="87" name="Google Shape;87;p17"/>
+          <p:cNvSpPr txBox="1">
+            <a:spLocks noGrp="1"/>
+          </p:cNvSpPr>
+          <p:nvPr>
+            <p:ph type="title"/>
+          </p:nvPr>
+        </p:nvSpPr>
+        <p:spPr>
+          <a:xfrm>
+            <a:off x="-1005393" y="451075"/>
+            <a:ext cx="11154800" cy="1016800"/>
+          </a:xfrm>
+          <a:prstGeom prst="rect">
+            <a:avLst/>
+          </a:prstGeom>
+        </p:spPr>
+        <p:txBody>
+          <a:bodyPr spcFirstLastPara="1" wrap="square" lIns="121900" tIns="121900" rIns="121900" bIns="121900" anchor="ctr" anchorCtr="0">
+            <a:noAutofit/>
+          </a:bodyPr>
+          <a:lstStyle/>
+          <a:p>
+            <a:r>
+              <a:rPr lang="en" sz="3200" dirty="0"/>
+              <a:t>4 Ben</a:t>
+            </a:r>
+            <a:r>
+              <a:rPr lang="en-US" sz="3200" dirty="0"/>
+              <a:t>e</a:t>
+            </a:r>
+            <a:r>
+              <a:rPr lang="en" sz="3200" dirty="0"/>
+              <a:t>fits of Tests</a:t>
+            </a:r>
+            <a:endParaRPr sz="3200" dirty="0"/>
+          </a:p>
+        </p:txBody>
+      </p:sp>
+      <p:sp>
+        <p:nvSpPr>
+          <p:cNvPr id="88" name="Google Shape;88;p17"/>
+          <p:cNvSpPr txBox="1">
+            <a:spLocks noGrp="1"/>
+          </p:cNvSpPr>
+          <p:nvPr>
+            <p:ph type="body" idx="1"/>
+          </p:nvPr>
+        </p:nvSpPr>
+        <p:spPr>
+          <a:xfrm>
+            <a:off x="662940" y="1697300"/>
+            <a:ext cx="7818120" cy="4642540"/>
+          </a:xfrm>
+          <a:prstGeom prst="rect">
+            <a:avLst/>
+          </a:prstGeom>
+        </p:spPr>
+        <p:txBody>
+          <a:bodyPr spcFirstLastPara="1" wrap="square" lIns="121900" tIns="121900" rIns="121900" bIns="121900" anchor="ctr" anchorCtr="0">
+            <a:noAutofit/>
+          </a:bodyPr>
+          <a:lstStyle/>
+          <a:p>
+            <a:pPr marL="745048" indent="-609585">
+              <a:buFont typeface="+mj-lt"/>
+              <a:buAutoNum type="arabicPeriod"/>
+            </a:pPr>
+            <a:r>
+              <a:rPr lang="en-US" sz="6000" dirty="0"/>
+              <a:t>Specification</a:t>
+            </a:r>
+          </a:p>
+          <a:p>
+            <a:pPr marL="745048" indent="-609585">
+              <a:buFont typeface="+mj-lt"/>
+              <a:buAutoNum type="arabicPeriod"/>
+            </a:pPr>
+            <a:r>
+              <a:rPr lang="en-US" sz="6000" dirty="0"/>
+              <a:t>Feedback</a:t>
+            </a:r>
+          </a:p>
+          <a:p>
+            <a:pPr marL="745048" indent="-609585">
+              <a:buFont typeface="+mj-lt"/>
+              <a:buAutoNum type="arabicPeriod"/>
+            </a:pPr>
+            <a:r>
+              <a:rPr lang="en-US" sz="6000" dirty="0"/>
+              <a:t>Regression</a:t>
+            </a:r>
+          </a:p>
+          <a:p>
+            <a:pPr marL="745048" indent="-609585">
+              <a:buFont typeface="+mj-lt"/>
+              <a:buAutoNum type="arabicPeriod"/>
+            </a:pPr>
+            <a:r>
+              <a:rPr lang="en-US" sz="6000" dirty="0"/>
+              <a:t>Granularity</a:t>
+            </a:r>
+            <a:endParaRPr sz="6000" dirty="0"/>
+          </a:p>
+        </p:txBody>
+      </p:sp>
+    </p:spTree>
+    <p:extLst>
+      <p:ext uri="{BB962C8B-B14F-4D97-AF65-F5344CB8AC3E}">
+        <p14:creationId xmlns:p14="http://schemas.microsoft.com/office/powerpoint/2010/main" val="3615187279"/>
+      </p:ext>
+    </p:extLst>
+  </p:cSld>
+  <p:clrMapOvr>
+    <a:masterClrMapping/>
+  </p:clrMapOvr>
+</p:sld>
+</file>
+
+<file path=ppt/slides/slide20.xml><?xml version="1.0" encoding="utf-8"?>
 <p:sld xmlns:a="http://schemas.openxmlformats.org/drawingml/2006/main" xmlns:r="http://schemas.openxmlformats.org/officeDocument/2006/relationships" xmlns:p="http://schemas.openxmlformats.org/presentationml/2006/main">
   <p:cSld>
     <p:spTree>
@@ -17442,7 +18634,7 @@
 </p:sld>
 </file>
 
-<file path=ppt/slides/slide19.xml><?xml version="1.0" encoding="utf-8"?>
+<file path=ppt/slides/slide21.xml><?xml version="1.0" encoding="utf-8"?>
 <p:sld xmlns:a="http://schemas.openxmlformats.org/drawingml/2006/main" xmlns:r="http://schemas.openxmlformats.org/officeDocument/2006/relationships" xmlns:p="http://schemas.openxmlformats.org/presentationml/2006/main">
   <p:cSld>
     <p:spTree>
@@ -18544,145 +19736,7 @@
 </p:sld>
 </file>
 
-<file path=ppt/slides/slide2.xml><?xml version="1.0" encoding="utf-8"?>
-<p:sld xmlns:a="http://schemas.openxmlformats.org/drawingml/2006/main" xmlns:r="http://schemas.openxmlformats.org/officeDocument/2006/relationships" xmlns:p="http://schemas.openxmlformats.org/presentationml/2006/main">
-  <p:cSld>
-    <p:spTree>
-      <p:nvGrpSpPr>
-        <p:cNvPr id="1" name="Shape 86"/>
-        <p:cNvGrpSpPr/>
-        <p:nvPr/>
-      </p:nvGrpSpPr>
-      <p:grpSpPr>
-        <a:xfrm>
-          <a:off x="0" y="0"/>
-          <a:ext cx="0" cy="0"/>
-          <a:chOff x="0" y="0"/>
-          <a:chExt cx="0" cy="0"/>
-        </a:xfrm>
-      </p:grpSpPr>
-      <p:sp>
-        <p:nvSpPr>
-          <p:cNvPr id="87" name="Google Shape;87;p17"/>
-          <p:cNvSpPr txBox="1">
-            <a:spLocks noGrp="1"/>
-          </p:cNvSpPr>
-          <p:nvPr>
-            <p:ph type="title"/>
-          </p:nvPr>
-        </p:nvSpPr>
-        <p:spPr>
-          <a:xfrm>
-            <a:off x="-1005393" y="451075"/>
-            <a:ext cx="11154800" cy="1016800"/>
-          </a:xfrm>
-          <a:prstGeom prst="rect">
-            <a:avLst/>
-          </a:prstGeom>
-        </p:spPr>
-        <p:txBody>
-          <a:bodyPr spcFirstLastPara="1" wrap="square" lIns="121900" tIns="121900" rIns="121900" bIns="121900" anchor="ctr" anchorCtr="0">
-            <a:noAutofit/>
-          </a:bodyPr>
-          <a:lstStyle/>
-          <a:p>
-            <a:r>
-              <a:rPr lang="en" sz="3200" dirty="0"/>
-              <a:t>4 Ben</a:t>
-            </a:r>
-            <a:r>
-              <a:rPr lang="en-US" sz="3200" dirty="0"/>
-              <a:t>e</a:t>
-            </a:r>
-            <a:r>
-              <a:rPr lang="en" sz="3200" dirty="0"/>
-              <a:t>fits of Tests</a:t>
-            </a:r>
-            <a:endParaRPr sz="3200" dirty="0"/>
-          </a:p>
-        </p:txBody>
-      </p:sp>
-      <p:sp>
-        <p:nvSpPr>
-          <p:cNvPr id="88" name="Google Shape;88;p17"/>
-          <p:cNvSpPr txBox="1">
-            <a:spLocks noGrp="1"/>
-          </p:cNvSpPr>
-          <p:nvPr>
-            <p:ph type="body" idx="1"/>
-          </p:nvPr>
-        </p:nvSpPr>
-        <p:spPr>
-          <a:xfrm>
-            <a:off x="662940" y="1697300"/>
-            <a:ext cx="7818120" cy="4642540"/>
-          </a:xfrm>
-          <a:prstGeom prst="rect">
-            <a:avLst/>
-          </a:prstGeom>
-        </p:spPr>
-        <p:txBody>
-          <a:bodyPr spcFirstLastPara="1" wrap="square" lIns="121900" tIns="121900" rIns="121900" bIns="121900" anchor="ctr" anchorCtr="0">
-            <a:noAutofit/>
-          </a:bodyPr>
-          <a:lstStyle/>
-          <a:p>
-            <a:pPr marL="745048" indent="-609585">
-              <a:buFont typeface="+mj-lt"/>
-              <a:buAutoNum type="arabicPeriod"/>
-            </a:pPr>
-            <a:r>
-              <a:rPr lang="en-US" sz="6000" dirty="0"/>
-              <a:t>Specification</a:t>
-            </a:r>
-          </a:p>
-          <a:p>
-            <a:pPr marL="745048" indent="-609585">
-              <a:buFont typeface="+mj-lt"/>
-              <a:buAutoNum type="arabicPeriod"/>
-            </a:pPr>
-            <a:r>
-              <a:rPr lang="en-US" sz="6000" dirty="0"/>
-              <a:t>Feedback</a:t>
-            </a:r>
-          </a:p>
-          <a:p>
-            <a:pPr marL="745048" indent="-609585">
-              <a:buFont typeface="+mj-lt"/>
-              <a:buAutoNum type="arabicPeriod"/>
-            </a:pPr>
-            <a:r>
-              <a:rPr lang="en-US" sz="6000" dirty="0"/>
-              <a:t>Regression</a:t>
-            </a:r>
-          </a:p>
-          <a:p>
-            <a:pPr marL="745048" indent="-609585">
-              <a:buFont typeface="+mj-lt"/>
-              <a:buAutoNum type="arabicPeriod"/>
-            </a:pPr>
-            <a:r>
-              <a:rPr lang="en-US" sz="6000" dirty="0"/>
-              <a:t>Granularity</a:t>
-            </a:r>
-            <a:endParaRPr sz="6000" dirty="0"/>
-          </a:p>
-        </p:txBody>
-      </p:sp>
-    </p:spTree>
-    <p:extLst>
-      <p:ext uri="{BB962C8B-B14F-4D97-AF65-F5344CB8AC3E}">
-        <p14:creationId xmlns:p14="http://schemas.microsoft.com/office/powerpoint/2010/main" val="3615187279"/>
-      </p:ext>
-    </p:extLst>
-  </p:cSld>
-  <p:clrMapOvr>
-    <a:masterClrMapping/>
-  </p:clrMapOvr>
-</p:sld>
-</file>
-
-<file path=ppt/slides/slide20.xml><?xml version="1.0" encoding="utf-8"?>
+<file path=ppt/slides/slide22.xml><?xml version="1.0" encoding="utf-8"?>
 <p:sld xmlns:a="http://schemas.openxmlformats.org/drawingml/2006/main" xmlns:r="http://schemas.openxmlformats.org/officeDocument/2006/relationships" xmlns:p="http://schemas.openxmlformats.org/presentationml/2006/main">
   <p:cSld>
     <p:spTree>
@@ -19809,7 +20863,7 @@
 </p:sld>
 </file>
 
-<file path=ppt/slides/slide21.xml><?xml version="1.0" encoding="utf-8"?>
+<file path=ppt/slides/slide23.xml><?xml version="1.0" encoding="utf-8"?>
 <p:sld xmlns:a="http://schemas.openxmlformats.org/drawingml/2006/main" xmlns:r="http://schemas.openxmlformats.org/officeDocument/2006/relationships" xmlns:p="http://schemas.openxmlformats.org/presentationml/2006/main">
   <p:cSld>
     <p:spTree>
@@ -21277,7 +22331,7 @@
 </p:sld>
 </file>
 
-<file path=ppt/slides/slide22.xml><?xml version="1.0" encoding="utf-8"?>
+<file path=ppt/slides/slide24.xml><?xml version="1.0" encoding="utf-8"?>
 <p:sld xmlns:a="http://schemas.openxmlformats.org/drawingml/2006/main" xmlns:r="http://schemas.openxmlformats.org/officeDocument/2006/relationships" xmlns:p="http://schemas.openxmlformats.org/presentationml/2006/main">
   <p:cSld>
     <p:spTree>
@@ -25005,6 +26059,307 @@
   <p:cSld>
     <p:spTree>
       <p:nvGrpSpPr>
+        <p:cNvPr id="1" name="Shape 86"/>
+        <p:cNvGrpSpPr/>
+        <p:nvPr/>
+      </p:nvGrpSpPr>
+      <p:grpSpPr>
+        <a:xfrm>
+          <a:off x="0" y="0"/>
+          <a:ext cx="0" cy="0"/>
+          <a:chOff x="0" y="0"/>
+          <a:chExt cx="0" cy="0"/>
+        </a:xfrm>
+      </p:grpSpPr>
+      <p:sp>
+        <p:nvSpPr>
+          <p:cNvPr id="88" name="Google Shape;88;p17"/>
+          <p:cNvSpPr txBox="1">
+            <a:spLocks noGrp="1"/>
+          </p:cNvSpPr>
+          <p:nvPr>
+            <p:ph type="body" idx="1"/>
+          </p:nvPr>
+        </p:nvSpPr>
+        <p:spPr>
+          <a:xfrm>
+            <a:off x="1293140" y="1647872"/>
+            <a:ext cx="4984092" cy="4642540"/>
+          </a:xfrm>
+          <a:prstGeom prst="rect">
+            <a:avLst/>
+          </a:prstGeom>
+        </p:spPr>
+        <p:txBody>
+          <a:bodyPr spcFirstLastPara="1" wrap="square" lIns="121900" tIns="121900" rIns="121900" bIns="121900" anchor="ctr" anchorCtr="0">
+            <a:noAutofit/>
+          </a:bodyPr>
+          <a:lstStyle/>
+          <a:p>
+            <a:pPr marL="745048" indent="-609585">
+              <a:buFont typeface="+mj-lt"/>
+              <a:buAutoNum type="arabicPeriod"/>
+            </a:pPr>
+            <a:r>
+              <a:rPr lang="en-US" sz="6000" dirty="0"/>
+              <a:t>Intention</a:t>
+            </a:r>
+          </a:p>
+          <a:p>
+            <a:pPr marL="745048" indent="-609585">
+              <a:buFont typeface="+mj-lt"/>
+              <a:buAutoNum type="arabicPeriod"/>
+            </a:pPr>
+            <a:r>
+              <a:rPr lang="en-US" sz="6000" dirty="0"/>
+              <a:t>Location</a:t>
+            </a:r>
+          </a:p>
+          <a:p>
+            <a:pPr marL="745048" indent="-609585">
+              <a:buFont typeface="+mj-lt"/>
+              <a:buAutoNum type="arabicPeriod"/>
+            </a:pPr>
+            <a:r>
+              <a:rPr lang="en-US" sz="6000" dirty="0"/>
+              <a:t>Details</a:t>
+            </a:r>
+          </a:p>
+        </p:txBody>
+      </p:sp>
+      <p:sp>
+        <p:nvSpPr>
+          <p:cNvPr id="4" name="Google Shape;87;p17">
+            <a:extLst>
+              <a:ext uri="{FF2B5EF4-FFF2-40B4-BE49-F238E27FC236}">
+                <a16:creationId xmlns:a16="http://schemas.microsoft.com/office/drawing/2014/main" id="{B8587227-42A8-5B13-D3FB-CA6F1063FE0D}"/>
+              </a:ext>
+            </a:extLst>
+          </p:cNvPr>
+          <p:cNvSpPr txBox="1">
+            <a:spLocks noGrp="1"/>
+          </p:cNvSpPr>
+          <p:nvPr>
+            <p:ph type="title"/>
+          </p:nvPr>
+        </p:nvSpPr>
+        <p:spPr>
+          <a:xfrm>
+            <a:off x="-1005393" y="451075"/>
+            <a:ext cx="11154800" cy="1016800"/>
+          </a:xfrm>
+          <a:prstGeom prst="rect">
+            <a:avLst/>
+          </a:prstGeom>
+        </p:spPr>
+        <p:txBody>
+          <a:bodyPr spcFirstLastPara="1" wrap="square" lIns="121900" tIns="121900" rIns="121900" bIns="121900" anchor="ctr" anchorCtr="0">
+            <a:noAutofit/>
+          </a:bodyPr>
+          <a:lstStyle/>
+          <a:p>
+            <a:r>
+              <a:rPr lang="en-US" sz="3200" dirty="0"/>
+              <a:t>Talking to the Driver</a:t>
+            </a:r>
+            <a:endParaRPr sz="3200" dirty="0"/>
+          </a:p>
+        </p:txBody>
+      </p:sp>
+      <p:sp>
+        <p:nvSpPr>
+          <p:cNvPr id="5" name="Down Arrow 4">
+            <a:extLst>
+              <a:ext uri="{FF2B5EF4-FFF2-40B4-BE49-F238E27FC236}">
+                <a16:creationId xmlns:a16="http://schemas.microsoft.com/office/drawing/2014/main" id="{1A2499A5-C8A8-CB3C-A63D-DAC11550034F}"/>
+              </a:ext>
+            </a:extLst>
+          </p:cNvPr>
+          <p:cNvSpPr/>
+          <p:nvPr/>
+        </p:nvSpPr>
+        <p:spPr>
+          <a:xfrm>
+            <a:off x="444843" y="2504867"/>
+            <a:ext cx="926756" cy="3027406"/>
+          </a:xfrm>
+          <a:prstGeom prst="downArrow">
+            <a:avLst/>
+          </a:prstGeom>
+          <a:solidFill>
+            <a:schemeClr val="bg1">
+              <a:lumMod val="85000"/>
+            </a:schemeClr>
+          </a:solidFill>
+        </p:spPr>
+        <p:style>
+          <a:lnRef idx="2">
+            <a:schemeClr val="accent1">
+              <a:shade val="50000"/>
+            </a:schemeClr>
+          </a:lnRef>
+          <a:fillRef idx="1">
+            <a:schemeClr val="accent1"/>
+          </a:fillRef>
+          <a:effectRef idx="0">
+            <a:schemeClr val="accent1"/>
+          </a:effectRef>
+          <a:fontRef idx="minor">
+            <a:schemeClr val="lt1"/>
+          </a:fontRef>
+        </p:style>
+        <p:txBody>
+          <a:bodyPr rtlCol="0" anchor="ctr"/>
+          <a:lstStyle/>
+          <a:p>
+            <a:pPr algn="ctr"/>
+            <a:endParaRPr lang="en-US"/>
+          </a:p>
+        </p:txBody>
+      </p:sp>
+    </p:spTree>
+    <p:extLst>
+      <p:ext uri="{BB962C8B-B14F-4D97-AF65-F5344CB8AC3E}">
+        <p14:creationId xmlns:p14="http://schemas.microsoft.com/office/powerpoint/2010/main" val="3128396577"/>
+      </p:ext>
+    </p:extLst>
+  </p:cSld>
+  <p:clrMapOvr>
+    <a:masterClrMapping/>
+  </p:clrMapOvr>
+</p:sld>
+</file>
+
+<file path=ppt/slides/slide4.xml><?xml version="1.0" encoding="utf-8"?>
+<p:sld xmlns:a="http://schemas.openxmlformats.org/drawingml/2006/main" xmlns:r="http://schemas.openxmlformats.org/officeDocument/2006/relationships" xmlns:p="http://schemas.openxmlformats.org/presentationml/2006/main">
+  <p:cSld>
+    <p:spTree>
+      <p:nvGrpSpPr>
+        <p:cNvPr id="1" name="Shape 86"/>
+        <p:cNvGrpSpPr/>
+        <p:nvPr/>
+      </p:nvGrpSpPr>
+      <p:grpSpPr>
+        <a:xfrm>
+          <a:off x="0" y="0"/>
+          <a:ext cx="0" cy="0"/>
+          <a:chOff x="0" y="0"/>
+          <a:chExt cx="0" cy="0"/>
+        </a:xfrm>
+      </p:grpSpPr>
+      <p:sp>
+        <p:nvSpPr>
+          <p:cNvPr id="88" name="Google Shape;88;p17"/>
+          <p:cNvSpPr txBox="1">
+            <a:spLocks noGrp="1"/>
+          </p:cNvSpPr>
+          <p:nvPr>
+            <p:ph type="body" idx="1"/>
+          </p:nvPr>
+        </p:nvSpPr>
+        <p:spPr>
+          <a:xfrm>
+            <a:off x="2079954" y="1107730"/>
+            <a:ext cx="4984092" cy="4642540"/>
+          </a:xfrm>
+          <a:prstGeom prst="rect">
+            <a:avLst/>
+          </a:prstGeom>
+        </p:spPr>
+        <p:txBody>
+          <a:bodyPr spcFirstLastPara="1" wrap="square" lIns="121900" tIns="121900" rIns="121900" bIns="121900" anchor="ctr" anchorCtr="0">
+            <a:noAutofit/>
+          </a:bodyPr>
+          <a:lstStyle/>
+          <a:p>
+            <a:pPr marL="135463" indent="0">
+              <a:buNone/>
+            </a:pPr>
+            <a:r>
+              <a:rPr lang="en-US" sz="14000" dirty="0"/>
+              <a:t>0</a:t>
+            </a:r>
+            <a:r>
+              <a:rPr lang="en-US" sz="14000" dirty="0">
+                <a:latin typeface="Playfair Display" pitchFamily="2" charset="77"/>
+              </a:rPr>
+              <a:t> → </a:t>
+            </a:r>
+            <a:r>
+              <a:rPr lang="en-US" sz="14000" dirty="0"/>
+              <a:t>1</a:t>
+            </a:r>
+          </a:p>
+        </p:txBody>
+      </p:sp>
+      <p:sp>
+        <p:nvSpPr>
+          <p:cNvPr id="6" name="Google Shape;87;p17">
+            <a:extLst>
+              <a:ext uri="{FF2B5EF4-FFF2-40B4-BE49-F238E27FC236}">
+                <a16:creationId xmlns:a16="http://schemas.microsoft.com/office/drawing/2014/main" id="{07EB6AE4-C4FF-BB14-1313-ACE61F92D1FD}"/>
+              </a:ext>
+            </a:extLst>
+          </p:cNvPr>
+          <p:cNvSpPr txBox="1">
+            <a:spLocks noGrp="1"/>
+          </p:cNvSpPr>
+          <p:nvPr>
+            <p:ph type="title"/>
+          </p:nvPr>
+        </p:nvSpPr>
+        <p:spPr>
+          <a:xfrm>
+            <a:off x="-1005400" y="5241870"/>
+            <a:ext cx="11154800" cy="1016800"/>
+          </a:xfrm>
+          <a:prstGeom prst="rect">
+            <a:avLst/>
+          </a:prstGeom>
+        </p:spPr>
+        <p:txBody>
+          <a:bodyPr spcFirstLastPara="1" wrap="square" lIns="121900" tIns="121900" rIns="121900" bIns="121900" anchor="ctr" anchorCtr="0">
+            <a:noAutofit/>
+          </a:bodyPr>
+          <a:lstStyle/>
+          <a:p>
+            <a:r>
+              <a:rPr lang="en-US" sz="3200" i="1" dirty="0"/>
+              <a:t>The first time you do </a:t>
+            </a:r>
+            <a:r>
+              <a:rPr lang="en-US" sz="3200" b="1" i="1" dirty="0"/>
+              <a:t>anything</a:t>
+            </a:r>
+            <a:br>
+              <a:rPr lang="en-US" sz="3200" i="1" dirty="0"/>
+            </a:br>
+            <a:r>
+              <a:rPr lang="en-US" sz="3200" i="1" dirty="0"/>
+              <a:t> it takes the longest</a:t>
+            </a:r>
+            <a:endParaRPr sz="3200" i="1" dirty="0"/>
+          </a:p>
+        </p:txBody>
+      </p:sp>
+    </p:spTree>
+    <p:extLst>
+      <p:ext uri="{BB962C8B-B14F-4D97-AF65-F5344CB8AC3E}">
+        <p14:creationId xmlns:p14="http://schemas.microsoft.com/office/powerpoint/2010/main" val="2959355987"/>
+      </p:ext>
+    </p:extLst>
+  </p:cSld>
+  <p:clrMapOvr>
+    <a:masterClrMapping/>
+  </p:clrMapOvr>
+</p:sld>
+</file>
+
+<file path=ppt/slides/slide5.xml><?xml version="1.0" encoding="utf-8"?>
+<p:sld xmlns:a="http://schemas.openxmlformats.org/drawingml/2006/main" xmlns:r="http://schemas.openxmlformats.org/officeDocument/2006/relationships" xmlns:p="http://schemas.openxmlformats.org/presentationml/2006/main">
+  <p:cSld>
+    <p:spTree>
+      <p:nvGrpSpPr>
         <p:cNvPr id="1" name="Shape 196"/>
         <p:cNvGrpSpPr/>
         <p:nvPr/>
@@ -26477,7 +27832,7 @@
 </p:sld>
 </file>
 
-<file path=ppt/slides/slide4.xml><?xml version="1.0" encoding="utf-8"?>
+<file path=ppt/slides/slide6.xml><?xml version="1.0" encoding="utf-8"?>
 <p:sld xmlns:a="http://schemas.openxmlformats.org/drawingml/2006/main" xmlns:r="http://schemas.openxmlformats.org/officeDocument/2006/relationships" xmlns:p="http://schemas.openxmlformats.org/presentationml/2006/main">
   <p:cSld>
     <p:spTree>
@@ -27542,7 +28897,7 @@
 </p:sld>
 </file>
 
-<file path=ppt/slides/slide5.xml><?xml version="1.0" encoding="utf-8"?>
+<file path=ppt/slides/slide7.xml><?xml version="1.0" encoding="utf-8"?>
 <p:sld xmlns:a="http://schemas.openxmlformats.org/drawingml/2006/main" xmlns:r="http://schemas.openxmlformats.org/officeDocument/2006/relationships" xmlns:p="http://schemas.openxmlformats.org/presentationml/2006/main">
   <p:cSld>
     <p:spTree>
@@ -28559,7 +29914,7 @@
 </p:sld>
 </file>
 
-<file path=ppt/slides/slide6.xml><?xml version="1.0" encoding="utf-8"?>
+<file path=ppt/slides/slide8.xml><?xml version="1.0" encoding="utf-8"?>
 <p:sld xmlns:a="http://schemas.openxmlformats.org/drawingml/2006/main" xmlns:r="http://schemas.openxmlformats.org/officeDocument/2006/relationships" xmlns:p="http://schemas.openxmlformats.org/presentationml/2006/main">
   <p:cSld>
     <p:spTree>
@@ -30123,7 +31478,7 @@
 </p:sld>
 </file>
 
-<file path=ppt/slides/slide7.xml><?xml version="1.0" encoding="utf-8"?>
+<file path=ppt/slides/slide9.xml><?xml version="1.0" encoding="utf-8"?>
 <p:sld xmlns:a="http://schemas.openxmlformats.org/drawingml/2006/main" xmlns:r="http://schemas.openxmlformats.org/officeDocument/2006/relationships" xmlns:p="http://schemas.openxmlformats.org/presentationml/2006/main">
   <p:cSld>
     <p:spTree>
@@ -30168,7 +31523,7 @@
             <a:fld id="{00000000-1234-1234-1234-123412341234}" type="slidenum">
               <a:rPr lang="en"/>
               <a:pPr/>
-              <a:t>7</a:t>
+              <a:t>9</a:t>
             </a:fld>
             <a:endParaRPr/>
           </a:p>
@@ -32290,840 +33645,6 @@
     <p:extLst>
       <p:ext uri="{BB962C8B-B14F-4D97-AF65-F5344CB8AC3E}">
         <p14:creationId xmlns:p14="http://schemas.microsoft.com/office/powerpoint/2010/main" val="3319735773"/>
-      </p:ext>
-    </p:extLst>
-  </p:cSld>
-  <p:clrMapOvr>
-    <a:masterClrMapping/>
-  </p:clrMapOvr>
-</p:sld>
-</file>
-
-<file path=ppt/slides/slide8.xml><?xml version="1.0" encoding="utf-8"?>
-<p:sld xmlns:a="http://schemas.openxmlformats.org/drawingml/2006/main" xmlns:r="http://schemas.openxmlformats.org/officeDocument/2006/relationships" xmlns:p="http://schemas.openxmlformats.org/presentationml/2006/main">
-  <p:cSld>
-    <p:spTree>
-      <p:nvGrpSpPr>
-        <p:cNvPr id="1" name="Shape 196"/>
-        <p:cNvGrpSpPr/>
-        <p:nvPr/>
-      </p:nvGrpSpPr>
-      <p:grpSpPr>
-        <a:xfrm>
-          <a:off x="0" y="0"/>
-          <a:ext cx="0" cy="0"/>
-          <a:chOff x="0" y="0"/>
-          <a:chExt cx="0" cy="0"/>
-        </a:xfrm>
-      </p:grpSpPr>
-      <p:sp>
-        <p:nvSpPr>
-          <p:cNvPr id="124" name="Google Shape;198;p29">
-            <a:extLst>
-              <a:ext uri="{FF2B5EF4-FFF2-40B4-BE49-F238E27FC236}">
-                <a16:creationId xmlns:a16="http://schemas.microsoft.com/office/drawing/2014/main" id="{79FB44A5-D80C-2141-8288-17FF0ED4B699}"/>
-              </a:ext>
-            </a:extLst>
-          </p:cNvPr>
-          <p:cNvSpPr txBox="1">
-            <a:spLocks/>
-          </p:cNvSpPr>
-          <p:nvPr/>
-        </p:nvSpPr>
-        <p:spPr>
-          <a:xfrm>
-            <a:off x="381000" y="2378535"/>
-            <a:ext cx="8331200" cy="4028390"/>
-          </a:xfrm>
-          <a:prstGeom prst="rect">
-            <a:avLst/>
-          </a:prstGeom>
-          <a:noFill/>
-          <a:ln>
-            <a:noFill/>
-          </a:ln>
-        </p:spPr>
-        <p:txBody>
-          <a:bodyPr spcFirstLastPara="1" wrap="square" lIns="121900" tIns="121900" rIns="121900" bIns="121900" anchor="t" anchorCtr="0">
-            <a:noAutofit/>
-          </a:bodyPr>
-          <a:lstStyle>
-            <a:defPPr marR="0" lvl="0" algn="l" rtl="0">
-              <a:lnSpc>
-                <a:spcPct val="100000"/>
-              </a:lnSpc>
-              <a:spcBef>
-                <a:spcPts val="0"/>
-              </a:spcBef>
-              <a:spcAft>
-                <a:spcPts val="0"/>
-              </a:spcAft>
-            </a:defPPr>
-            <a:lvl1pPr marL="457200" marR="0" lvl="0" indent="-330200" algn="l" rtl="0">
-              <a:lnSpc>
-                <a:spcPct val="100000"/>
-              </a:lnSpc>
-              <a:spcBef>
-                <a:spcPts val="600"/>
-              </a:spcBef>
-              <a:spcAft>
-                <a:spcPts val="0"/>
-              </a:spcAft>
-              <a:buClr>
-                <a:schemeClr val="dk1"/>
-              </a:buClr>
-              <a:buSzPts val="1600"/>
-              <a:buFont typeface="PT Serif"/>
-              <a:buChar char="▣"/>
-              <a:defRPr sz="1600" b="0" i="0" u="none" strike="noStrike" cap="none">
-                <a:solidFill>
-                  <a:schemeClr val="dk1"/>
-                </a:solidFill>
-                <a:latin typeface="PT Serif"/>
-                <a:ea typeface="PT Serif"/>
-                <a:cs typeface="PT Serif"/>
-                <a:sym typeface="PT Serif"/>
-              </a:defRPr>
-            </a:lvl1pPr>
-            <a:lvl2pPr marL="914400" marR="0" lvl="1" indent="-330200" algn="l" rtl="0">
-              <a:lnSpc>
-                <a:spcPct val="100000"/>
-              </a:lnSpc>
-              <a:spcBef>
-                <a:spcPts val="0"/>
-              </a:spcBef>
-              <a:spcAft>
-                <a:spcPts val="0"/>
-              </a:spcAft>
-              <a:buClr>
-                <a:schemeClr val="dk1"/>
-              </a:buClr>
-              <a:buSzPts val="1600"/>
-              <a:buFont typeface="PT Serif"/>
-              <a:buChar char="○"/>
-              <a:defRPr sz="1600" b="0" i="0" u="none" strike="noStrike" cap="none">
-                <a:solidFill>
-                  <a:schemeClr val="dk1"/>
-                </a:solidFill>
-                <a:latin typeface="PT Serif"/>
-                <a:ea typeface="PT Serif"/>
-                <a:cs typeface="PT Serif"/>
-                <a:sym typeface="PT Serif"/>
-              </a:defRPr>
-            </a:lvl2pPr>
-            <a:lvl3pPr marL="1371600" marR="0" lvl="2" indent="-330200" algn="l" rtl="0">
-              <a:lnSpc>
-                <a:spcPct val="100000"/>
-              </a:lnSpc>
-              <a:spcBef>
-                <a:spcPts val="0"/>
-              </a:spcBef>
-              <a:spcAft>
-                <a:spcPts val="0"/>
-              </a:spcAft>
-              <a:buClr>
-                <a:schemeClr val="dk1"/>
-              </a:buClr>
-              <a:buSzPts val="1600"/>
-              <a:buFont typeface="PT Serif"/>
-              <a:buChar char="■"/>
-              <a:defRPr sz="1600" b="0" i="0" u="none" strike="noStrike" cap="none">
-                <a:solidFill>
-                  <a:schemeClr val="dk1"/>
-                </a:solidFill>
-                <a:latin typeface="PT Serif"/>
-                <a:ea typeface="PT Serif"/>
-                <a:cs typeface="PT Serif"/>
-                <a:sym typeface="PT Serif"/>
-              </a:defRPr>
-            </a:lvl3pPr>
-            <a:lvl4pPr marL="1828800" marR="0" lvl="3" indent="-330200" algn="l" rtl="0">
-              <a:lnSpc>
-                <a:spcPct val="100000"/>
-              </a:lnSpc>
-              <a:spcBef>
-                <a:spcPts val="0"/>
-              </a:spcBef>
-              <a:spcAft>
-                <a:spcPts val="0"/>
-              </a:spcAft>
-              <a:buClr>
-                <a:schemeClr val="dk1"/>
-              </a:buClr>
-              <a:buSzPts val="1600"/>
-              <a:buFont typeface="PT Serif"/>
-              <a:buChar char="●"/>
-              <a:defRPr sz="1600" b="0" i="0" u="none" strike="noStrike" cap="none">
-                <a:solidFill>
-                  <a:schemeClr val="dk1"/>
-                </a:solidFill>
-                <a:latin typeface="PT Serif"/>
-                <a:ea typeface="PT Serif"/>
-                <a:cs typeface="PT Serif"/>
-                <a:sym typeface="PT Serif"/>
-              </a:defRPr>
-            </a:lvl4pPr>
-            <a:lvl5pPr marL="2286000" marR="0" lvl="4" indent="-330200" algn="l" rtl="0">
-              <a:lnSpc>
-                <a:spcPct val="100000"/>
-              </a:lnSpc>
-              <a:spcBef>
-                <a:spcPts val="0"/>
-              </a:spcBef>
-              <a:spcAft>
-                <a:spcPts val="0"/>
-              </a:spcAft>
-              <a:buClr>
-                <a:schemeClr val="dk1"/>
-              </a:buClr>
-              <a:buSzPts val="1600"/>
-              <a:buFont typeface="PT Serif"/>
-              <a:buChar char="○"/>
-              <a:defRPr sz="1600" b="0" i="0" u="none" strike="noStrike" cap="none">
-                <a:solidFill>
-                  <a:schemeClr val="dk1"/>
-                </a:solidFill>
-                <a:latin typeface="PT Serif"/>
-                <a:ea typeface="PT Serif"/>
-                <a:cs typeface="PT Serif"/>
-                <a:sym typeface="PT Serif"/>
-              </a:defRPr>
-            </a:lvl5pPr>
-            <a:lvl6pPr marL="2743200" marR="0" lvl="5" indent="-330200" algn="l" rtl="0">
-              <a:lnSpc>
-                <a:spcPct val="100000"/>
-              </a:lnSpc>
-              <a:spcBef>
-                <a:spcPts val="0"/>
-              </a:spcBef>
-              <a:spcAft>
-                <a:spcPts val="0"/>
-              </a:spcAft>
-              <a:buClr>
-                <a:schemeClr val="dk1"/>
-              </a:buClr>
-              <a:buSzPts val="1600"/>
-              <a:buFont typeface="PT Serif"/>
-              <a:buChar char="■"/>
-              <a:defRPr sz="1600" b="0" i="0" u="none" strike="noStrike" cap="none">
-                <a:solidFill>
-                  <a:schemeClr val="dk1"/>
-                </a:solidFill>
-                <a:latin typeface="PT Serif"/>
-                <a:ea typeface="PT Serif"/>
-                <a:cs typeface="PT Serif"/>
-                <a:sym typeface="PT Serif"/>
-              </a:defRPr>
-            </a:lvl6pPr>
-            <a:lvl7pPr marL="3200400" marR="0" lvl="6" indent="-330200" algn="l" rtl="0">
-              <a:lnSpc>
-                <a:spcPct val="100000"/>
-              </a:lnSpc>
-              <a:spcBef>
-                <a:spcPts val="0"/>
-              </a:spcBef>
-              <a:spcAft>
-                <a:spcPts val="0"/>
-              </a:spcAft>
-              <a:buClr>
-                <a:schemeClr val="dk1"/>
-              </a:buClr>
-              <a:buSzPts val="1600"/>
-              <a:buFont typeface="PT Serif"/>
-              <a:buChar char="●"/>
-              <a:defRPr sz="1600" b="0" i="0" u="none" strike="noStrike" cap="none">
-                <a:solidFill>
-                  <a:schemeClr val="dk1"/>
-                </a:solidFill>
-                <a:latin typeface="PT Serif"/>
-                <a:ea typeface="PT Serif"/>
-                <a:cs typeface="PT Serif"/>
-                <a:sym typeface="PT Serif"/>
-              </a:defRPr>
-            </a:lvl7pPr>
-            <a:lvl8pPr marL="3657600" marR="0" lvl="7" indent="-330200" algn="l" rtl="0">
-              <a:lnSpc>
-                <a:spcPct val="100000"/>
-              </a:lnSpc>
-              <a:spcBef>
-                <a:spcPts val="0"/>
-              </a:spcBef>
-              <a:spcAft>
-                <a:spcPts val="0"/>
-              </a:spcAft>
-              <a:buClr>
-                <a:schemeClr val="dk1"/>
-              </a:buClr>
-              <a:buSzPts val="1600"/>
-              <a:buFont typeface="PT Serif"/>
-              <a:buChar char="○"/>
-              <a:defRPr sz="1600" b="0" i="0" u="none" strike="noStrike" cap="none">
-                <a:solidFill>
-                  <a:schemeClr val="dk1"/>
-                </a:solidFill>
-                <a:latin typeface="PT Serif"/>
-                <a:ea typeface="PT Serif"/>
-                <a:cs typeface="PT Serif"/>
-                <a:sym typeface="PT Serif"/>
-              </a:defRPr>
-            </a:lvl8pPr>
-            <a:lvl9pPr marL="4114800" marR="0" lvl="8" indent="-330200" algn="l" rtl="0">
-              <a:lnSpc>
-                <a:spcPct val="100000"/>
-              </a:lnSpc>
-              <a:spcBef>
-                <a:spcPts val="0"/>
-              </a:spcBef>
-              <a:spcAft>
-                <a:spcPts val="0"/>
-              </a:spcAft>
-              <a:buClr>
-                <a:schemeClr val="dk1"/>
-              </a:buClr>
-              <a:buSzPts val="1600"/>
-              <a:buFont typeface="PT Serif"/>
-              <a:buChar char="■"/>
-              <a:defRPr sz="1600" b="0" i="0" u="none" strike="noStrike" cap="none">
-                <a:solidFill>
-                  <a:schemeClr val="dk1"/>
-                </a:solidFill>
-                <a:latin typeface="PT Serif"/>
-                <a:ea typeface="PT Serif"/>
-                <a:cs typeface="PT Serif"/>
-                <a:sym typeface="PT Serif"/>
-              </a:defRPr>
-            </a:lvl9pPr>
-          </a:lstStyle>
-          <a:p>
-            <a:pPr marL="0" indent="0" algn="ctr">
-              <a:buNone/>
-            </a:pPr>
-            <a:r>
-              <a:rPr lang="en-US" sz="4800" b="1" i="1" dirty="0">
-                <a:latin typeface="Playfair Display"/>
-                <a:ea typeface="Playfair Display"/>
-                <a:cs typeface="Playfair Display"/>
-                <a:sym typeface="Playfair Display"/>
-              </a:rPr>
-              <a:t>Reality is Optional</a:t>
-            </a:r>
-          </a:p>
-          <a:p>
-            <a:pPr marL="0" indent="0" algn="ctr">
-              <a:buNone/>
-            </a:pPr>
-            <a:r>
-              <a:rPr lang="en-US" sz="4000" dirty="0"/>
-              <a:t>You only need to use realistic situations when they are also convenient. Otherwise, don’t</a:t>
-            </a:r>
-          </a:p>
-          <a:p>
-            <a:pPr marL="0" indent="0" algn="ctr">
-              <a:buNone/>
-            </a:pPr>
-            <a:r>
-              <a:rPr lang="en-US" sz="3600" i="1" strike="sngStrike" dirty="0">
-                <a:solidFill>
-                  <a:srgbClr val="851300"/>
-                </a:solidFill>
-              </a:rPr>
-              <a:t>Password = 2FX_V?Az8Wm/9CuZ%</a:t>
-            </a:r>
-          </a:p>
-          <a:p>
-            <a:pPr marL="0" indent="0" algn="ctr">
-              <a:buNone/>
-            </a:pPr>
-            <a:r>
-              <a:rPr lang="en-US" sz="3600" i="1" dirty="0">
-                <a:solidFill>
-                  <a:srgbClr val="00612B"/>
-                </a:solidFill>
-              </a:rPr>
-              <a:t>Password = Password</a:t>
-            </a:r>
-          </a:p>
-        </p:txBody>
-      </p:sp>
-      <p:pic>
-        <p:nvPicPr>
-          <p:cNvPr id="77" name="Picture 4" descr="How to Draw a Scarecrow - Really Easy Drawing Tutorial">
-            <a:extLst>
-              <a:ext uri="{FF2B5EF4-FFF2-40B4-BE49-F238E27FC236}">
-                <a16:creationId xmlns:a16="http://schemas.microsoft.com/office/drawing/2014/main" id="{F4787572-0CFA-7844-A7CA-D4EC97BE0F20}"/>
-              </a:ext>
-            </a:extLst>
-          </p:cNvPr>
-          <p:cNvPicPr>
-            <a:picLocks noChangeAspect="1" noChangeArrowheads="1"/>
-          </p:cNvPicPr>
-          <p:nvPr/>
-        </p:nvPicPr>
-        <p:blipFill>
-          <a:blip r:embed="rId3">
-            <a:extLst>
-              <a:ext uri="{28A0092B-C50C-407E-A947-70E740481C1C}">
-                <a14:useLocalDpi xmlns:a14="http://schemas.microsoft.com/office/drawing/2010/main" val="0"/>
-              </a:ext>
-            </a:extLst>
-          </a:blip>
-          <a:srcRect/>
-          <a:stretch>
-            <a:fillRect/>
-          </a:stretch>
-        </p:blipFill>
-        <p:spPr bwMode="auto">
-          <a:xfrm>
-            <a:off x="3740132" y="1179025"/>
-            <a:ext cx="1612936" cy="1607968"/>
-          </a:xfrm>
-          <a:prstGeom prst="rect">
-            <a:avLst/>
-          </a:prstGeom>
-          <a:noFill/>
-          <a:extLst>
-            <a:ext uri="{909E8E84-426E-40DD-AFC4-6F175D3DCCD1}">
-              <a14:hiddenFill xmlns:a14="http://schemas.microsoft.com/office/drawing/2010/main">
-                <a:solidFill>
-                  <a:srgbClr val="FFFFFF"/>
-                </a:solidFill>
-              </a14:hiddenFill>
-            </a:ext>
-          </a:extLst>
-        </p:spPr>
-      </p:pic>
-      <p:sp>
-        <p:nvSpPr>
-          <p:cNvPr id="10" name="Google Shape;197;p29">
-            <a:extLst>
-              <a:ext uri="{FF2B5EF4-FFF2-40B4-BE49-F238E27FC236}">
-                <a16:creationId xmlns:a16="http://schemas.microsoft.com/office/drawing/2014/main" id="{D4175E88-A14A-347F-09B1-E2E29172EE6D}"/>
-              </a:ext>
-            </a:extLst>
-          </p:cNvPr>
-          <p:cNvSpPr txBox="1">
-            <a:spLocks noGrp="1"/>
-          </p:cNvSpPr>
-          <p:nvPr>
-            <p:ph type="title"/>
-          </p:nvPr>
-        </p:nvSpPr>
-        <p:spPr>
-          <a:xfrm>
-            <a:off x="1327016" y="451075"/>
-            <a:ext cx="6439168" cy="1016800"/>
-          </a:xfrm>
-          <a:prstGeom prst="rect">
-            <a:avLst/>
-          </a:prstGeom>
-        </p:spPr>
-        <p:txBody>
-          <a:bodyPr spcFirstLastPara="1" wrap="square" lIns="121900" tIns="121900" rIns="121900" bIns="121900" anchor="ctr" anchorCtr="0">
-            <a:noAutofit/>
-          </a:bodyPr>
-          <a:lstStyle/>
-          <a:p>
-            <a:r>
-              <a:rPr lang="en" dirty="0"/>
-              <a:t>Rules for Test Scenarios</a:t>
-            </a:r>
-            <a:br>
-              <a:rPr lang="en" dirty="0"/>
-            </a:br>
-            <a:r>
-              <a:rPr lang="en" dirty="0"/>
-              <a:t>(6/6)</a:t>
-            </a:r>
-            <a:endParaRPr dirty="0"/>
-          </a:p>
-        </p:txBody>
-      </p:sp>
-    </p:spTree>
-    <p:extLst>
-      <p:ext uri="{BB962C8B-B14F-4D97-AF65-F5344CB8AC3E}">
-        <p14:creationId xmlns:p14="http://schemas.microsoft.com/office/powerpoint/2010/main" val="651455976"/>
-      </p:ext>
-    </p:extLst>
-  </p:cSld>
-  <p:clrMapOvr>
-    <a:masterClrMapping/>
-  </p:clrMapOvr>
-</p:sld>
-</file>
-
-<file path=ppt/slides/slide9.xml><?xml version="1.0" encoding="utf-8"?>
-<p:sld xmlns:a="http://schemas.openxmlformats.org/drawingml/2006/main" xmlns:r="http://schemas.openxmlformats.org/officeDocument/2006/relationships" xmlns:p="http://schemas.openxmlformats.org/presentationml/2006/main">
-  <p:cSld>
-    <p:spTree>
-      <p:nvGrpSpPr>
-        <p:cNvPr id="1" name=""/>
-        <p:cNvGrpSpPr/>
-        <p:nvPr/>
-      </p:nvGrpSpPr>
-      <p:grpSpPr>
-        <a:xfrm>
-          <a:off x="0" y="0"/>
-          <a:ext cx="0" cy="0"/>
-          <a:chOff x="0" y="0"/>
-          <a:chExt cx="0" cy="0"/>
-        </a:xfrm>
-      </p:grpSpPr>
-      <p:sp>
-        <p:nvSpPr>
-          <p:cNvPr id="2" name="Title 1">
-            <a:extLst>
-              <a:ext uri="{FF2B5EF4-FFF2-40B4-BE49-F238E27FC236}">
-                <a16:creationId xmlns:a16="http://schemas.microsoft.com/office/drawing/2014/main" id="{EDC1A474-B4B6-5E43-94C1-D5AF01A35276}"/>
-              </a:ext>
-            </a:extLst>
-          </p:cNvPr>
-          <p:cNvSpPr>
-            <a:spLocks noGrp="1"/>
-          </p:cNvSpPr>
-          <p:nvPr>
-            <p:ph type="ctrTitle" idx="4294967295"/>
-          </p:nvPr>
-        </p:nvSpPr>
-        <p:spPr>
-          <a:xfrm>
-            <a:off x="1315366" y="1671320"/>
-            <a:ext cx="6284667" cy="4945380"/>
-          </a:xfrm>
-        </p:spPr>
-        <p:txBody>
-          <a:bodyPr/>
-          <a:lstStyle/>
-          <a:p>
-            <a:r>
-              <a:rPr lang="en-GB" sz="13800" dirty="0">
-                <a:solidFill>
-                  <a:schemeClr val="tx1"/>
-                </a:solidFill>
-              </a:rPr>
-              <a:t>Do</a:t>
-            </a:r>
-            <a:br>
-              <a:rPr lang="en-GB" sz="13800" dirty="0">
-                <a:solidFill>
-                  <a:schemeClr val="tx1"/>
-                </a:solidFill>
-              </a:rPr>
-            </a:br>
-            <a:r>
-              <a:rPr lang="en-GB" sz="13800" dirty="0">
-                <a:solidFill>
-                  <a:schemeClr val="tx1"/>
-                </a:solidFill>
-              </a:rPr>
-              <a:t>Verify</a:t>
-            </a:r>
-          </a:p>
-        </p:txBody>
-      </p:sp>
-      <p:sp>
-        <p:nvSpPr>
-          <p:cNvPr id="4" name="Google Shape;198;p29">
-            <a:extLst>
-              <a:ext uri="{FF2B5EF4-FFF2-40B4-BE49-F238E27FC236}">
-                <a16:creationId xmlns:a16="http://schemas.microsoft.com/office/drawing/2014/main" id="{E5F6E51F-EC3D-D67A-2696-E89A7E17D042}"/>
-              </a:ext>
-            </a:extLst>
-          </p:cNvPr>
-          <p:cNvSpPr txBox="1">
-            <a:spLocks/>
-          </p:cNvSpPr>
-          <p:nvPr/>
-        </p:nvSpPr>
-        <p:spPr>
-          <a:xfrm>
-            <a:off x="292099" y="549852"/>
-            <a:ext cx="8331200" cy="1121468"/>
-          </a:xfrm>
-          <a:prstGeom prst="rect">
-            <a:avLst/>
-          </a:prstGeom>
-          <a:noFill/>
-          <a:ln>
-            <a:noFill/>
-          </a:ln>
-        </p:spPr>
-        <p:txBody>
-          <a:bodyPr spcFirstLastPara="1" wrap="square" lIns="121900" tIns="121900" rIns="121900" bIns="121900" anchor="t" anchorCtr="0">
-            <a:noAutofit/>
-          </a:bodyPr>
-          <a:lstStyle>
-            <a:defPPr marR="0" lvl="0" algn="l" rtl="0">
-              <a:lnSpc>
-                <a:spcPct val="100000"/>
-              </a:lnSpc>
-              <a:spcBef>
-                <a:spcPts val="0"/>
-              </a:spcBef>
-              <a:spcAft>
-                <a:spcPts val="0"/>
-              </a:spcAft>
-            </a:defPPr>
-            <a:lvl1pPr marL="457200" marR="0" lvl="0" indent="-330200" algn="l" rtl="0">
-              <a:lnSpc>
-                <a:spcPct val="100000"/>
-              </a:lnSpc>
-              <a:spcBef>
-                <a:spcPts val="600"/>
-              </a:spcBef>
-              <a:spcAft>
-                <a:spcPts val="0"/>
-              </a:spcAft>
-              <a:buClr>
-                <a:schemeClr val="dk1"/>
-              </a:buClr>
-              <a:buSzPts val="1600"/>
-              <a:buFont typeface="PT Serif"/>
-              <a:buChar char="▣"/>
-              <a:defRPr sz="1600" b="0" i="0" u="none" strike="noStrike" cap="none">
-                <a:solidFill>
-                  <a:schemeClr val="dk1"/>
-                </a:solidFill>
-                <a:latin typeface="PT Serif"/>
-                <a:ea typeface="PT Serif"/>
-                <a:cs typeface="PT Serif"/>
-                <a:sym typeface="PT Serif"/>
-              </a:defRPr>
-            </a:lvl1pPr>
-            <a:lvl2pPr marL="914400" marR="0" lvl="1" indent="-330200" algn="l" rtl="0">
-              <a:lnSpc>
-                <a:spcPct val="100000"/>
-              </a:lnSpc>
-              <a:spcBef>
-                <a:spcPts val="0"/>
-              </a:spcBef>
-              <a:spcAft>
-                <a:spcPts val="0"/>
-              </a:spcAft>
-              <a:buClr>
-                <a:schemeClr val="dk1"/>
-              </a:buClr>
-              <a:buSzPts val="1600"/>
-              <a:buFont typeface="PT Serif"/>
-              <a:buChar char="○"/>
-              <a:defRPr sz="1600" b="0" i="0" u="none" strike="noStrike" cap="none">
-                <a:solidFill>
-                  <a:schemeClr val="dk1"/>
-                </a:solidFill>
-                <a:latin typeface="PT Serif"/>
-                <a:ea typeface="PT Serif"/>
-                <a:cs typeface="PT Serif"/>
-                <a:sym typeface="PT Serif"/>
-              </a:defRPr>
-            </a:lvl2pPr>
-            <a:lvl3pPr marL="1371600" marR="0" lvl="2" indent="-330200" algn="l" rtl="0">
-              <a:lnSpc>
-                <a:spcPct val="100000"/>
-              </a:lnSpc>
-              <a:spcBef>
-                <a:spcPts val="0"/>
-              </a:spcBef>
-              <a:spcAft>
-                <a:spcPts val="0"/>
-              </a:spcAft>
-              <a:buClr>
-                <a:schemeClr val="dk1"/>
-              </a:buClr>
-              <a:buSzPts val="1600"/>
-              <a:buFont typeface="PT Serif"/>
-              <a:buChar char="■"/>
-              <a:defRPr sz="1600" b="0" i="0" u="none" strike="noStrike" cap="none">
-                <a:solidFill>
-                  <a:schemeClr val="dk1"/>
-                </a:solidFill>
-                <a:latin typeface="PT Serif"/>
-                <a:ea typeface="PT Serif"/>
-                <a:cs typeface="PT Serif"/>
-                <a:sym typeface="PT Serif"/>
-              </a:defRPr>
-            </a:lvl3pPr>
-            <a:lvl4pPr marL="1828800" marR="0" lvl="3" indent="-330200" algn="l" rtl="0">
-              <a:lnSpc>
-                <a:spcPct val="100000"/>
-              </a:lnSpc>
-              <a:spcBef>
-                <a:spcPts val="0"/>
-              </a:spcBef>
-              <a:spcAft>
-                <a:spcPts val="0"/>
-              </a:spcAft>
-              <a:buClr>
-                <a:schemeClr val="dk1"/>
-              </a:buClr>
-              <a:buSzPts val="1600"/>
-              <a:buFont typeface="PT Serif"/>
-              <a:buChar char="●"/>
-              <a:defRPr sz="1600" b="0" i="0" u="none" strike="noStrike" cap="none">
-                <a:solidFill>
-                  <a:schemeClr val="dk1"/>
-                </a:solidFill>
-                <a:latin typeface="PT Serif"/>
-                <a:ea typeface="PT Serif"/>
-                <a:cs typeface="PT Serif"/>
-                <a:sym typeface="PT Serif"/>
-              </a:defRPr>
-            </a:lvl4pPr>
-            <a:lvl5pPr marL="2286000" marR="0" lvl="4" indent="-330200" algn="l" rtl="0">
-              <a:lnSpc>
-                <a:spcPct val="100000"/>
-              </a:lnSpc>
-              <a:spcBef>
-                <a:spcPts val="0"/>
-              </a:spcBef>
-              <a:spcAft>
-                <a:spcPts val="0"/>
-              </a:spcAft>
-              <a:buClr>
-                <a:schemeClr val="dk1"/>
-              </a:buClr>
-              <a:buSzPts val="1600"/>
-              <a:buFont typeface="PT Serif"/>
-              <a:buChar char="○"/>
-              <a:defRPr sz="1600" b="0" i="0" u="none" strike="noStrike" cap="none">
-                <a:solidFill>
-                  <a:schemeClr val="dk1"/>
-                </a:solidFill>
-                <a:latin typeface="PT Serif"/>
-                <a:ea typeface="PT Serif"/>
-                <a:cs typeface="PT Serif"/>
-                <a:sym typeface="PT Serif"/>
-              </a:defRPr>
-            </a:lvl5pPr>
-            <a:lvl6pPr marL="2743200" marR="0" lvl="5" indent="-330200" algn="l" rtl="0">
-              <a:lnSpc>
-                <a:spcPct val="100000"/>
-              </a:lnSpc>
-              <a:spcBef>
-                <a:spcPts val="0"/>
-              </a:spcBef>
-              <a:spcAft>
-                <a:spcPts val="0"/>
-              </a:spcAft>
-              <a:buClr>
-                <a:schemeClr val="dk1"/>
-              </a:buClr>
-              <a:buSzPts val="1600"/>
-              <a:buFont typeface="PT Serif"/>
-              <a:buChar char="■"/>
-              <a:defRPr sz="1600" b="0" i="0" u="none" strike="noStrike" cap="none">
-                <a:solidFill>
-                  <a:schemeClr val="dk1"/>
-                </a:solidFill>
-                <a:latin typeface="PT Serif"/>
-                <a:ea typeface="PT Serif"/>
-                <a:cs typeface="PT Serif"/>
-                <a:sym typeface="PT Serif"/>
-              </a:defRPr>
-            </a:lvl6pPr>
-            <a:lvl7pPr marL="3200400" marR="0" lvl="6" indent="-330200" algn="l" rtl="0">
-              <a:lnSpc>
-                <a:spcPct val="100000"/>
-              </a:lnSpc>
-              <a:spcBef>
-                <a:spcPts val="0"/>
-              </a:spcBef>
-              <a:spcAft>
-                <a:spcPts val="0"/>
-              </a:spcAft>
-              <a:buClr>
-                <a:schemeClr val="dk1"/>
-              </a:buClr>
-              <a:buSzPts val="1600"/>
-              <a:buFont typeface="PT Serif"/>
-              <a:buChar char="●"/>
-              <a:defRPr sz="1600" b="0" i="0" u="none" strike="noStrike" cap="none">
-                <a:solidFill>
-                  <a:schemeClr val="dk1"/>
-                </a:solidFill>
-                <a:latin typeface="PT Serif"/>
-                <a:ea typeface="PT Serif"/>
-                <a:cs typeface="PT Serif"/>
-                <a:sym typeface="PT Serif"/>
-              </a:defRPr>
-            </a:lvl7pPr>
-            <a:lvl8pPr marL="3657600" marR="0" lvl="7" indent="-330200" algn="l" rtl="0">
-              <a:lnSpc>
-                <a:spcPct val="100000"/>
-              </a:lnSpc>
-              <a:spcBef>
-                <a:spcPts val="0"/>
-              </a:spcBef>
-              <a:spcAft>
-                <a:spcPts val="0"/>
-              </a:spcAft>
-              <a:buClr>
-                <a:schemeClr val="dk1"/>
-              </a:buClr>
-              <a:buSzPts val="1600"/>
-              <a:buFont typeface="PT Serif"/>
-              <a:buChar char="○"/>
-              <a:defRPr sz="1600" b="0" i="0" u="none" strike="noStrike" cap="none">
-                <a:solidFill>
-                  <a:schemeClr val="dk1"/>
-                </a:solidFill>
-                <a:latin typeface="PT Serif"/>
-                <a:ea typeface="PT Serif"/>
-                <a:cs typeface="PT Serif"/>
-                <a:sym typeface="PT Serif"/>
-              </a:defRPr>
-            </a:lvl8pPr>
-            <a:lvl9pPr marL="4114800" marR="0" lvl="8" indent="-330200" algn="l" rtl="0">
-              <a:lnSpc>
-                <a:spcPct val="100000"/>
-              </a:lnSpc>
-              <a:spcBef>
-                <a:spcPts val="0"/>
-              </a:spcBef>
-              <a:spcAft>
-                <a:spcPts val="0"/>
-              </a:spcAft>
-              <a:buClr>
-                <a:schemeClr val="dk1"/>
-              </a:buClr>
-              <a:buSzPts val="1600"/>
-              <a:buFont typeface="PT Serif"/>
-              <a:buChar char="■"/>
-              <a:defRPr sz="1600" b="0" i="0" u="none" strike="noStrike" cap="none">
-                <a:solidFill>
-                  <a:schemeClr val="dk1"/>
-                </a:solidFill>
-                <a:latin typeface="PT Serif"/>
-                <a:ea typeface="PT Serif"/>
-                <a:cs typeface="PT Serif"/>
-                <a:sym typeface="PT Serif"/>
-              </a:defRPr>
-            </a:lvl9pPr>
-          </a:lstStyle>
-          <a:p>
-            <a:pPr marL="0" indent="0" algn="ctr">
-              <a:buNone/>
-            </a:pPr>
-            <a:r>
-              <a:rPr lang="en-US" sz="4800" b="1" i="1" dirty="0">
-                <a:solidFill>
-                  <a:schemeClr val="tx1">
-                    <a:lumMod val="50000"/>
-                    <a:lumOff val="50000"/>
-                  </a:schemeClr>
-                </a:solidFill>
-                <a:latin typeface="Playfair Display"/>
-                <a:ea typeface="Playfair Display"/>
-                <a:cs typeface="Playfair Display"/>
-                <a:sym typeface="Playfair Display"/>
-              </a:rPr>
-              <a:t>Parts of a Test</a:t>
-            </a:r>
-          </a:p>
-        </p:txBody>
-      </p:sp>
-    </p:spTree>
-    <p:extLst>
-      <p:ext uri="{BB962C8B-B14F-4D97-AF65-F5344CB8AC3E}">
-        <p14:creationId xmlns:p14="http://schemas.microsoft.com/office/powerpoint/2010/main" val="1475005755"/>
       </p:ext>
     </p:extLst>
   </p:cSld>

</xml_diff>